<commit_message>
updating file names to clean up github
</commit_message>
<xml_diff>
--- a/RNNs.pptx
+++ b/RNNs.pptx
@@ -14,6 +14,14 @@
     <p:sldId id="275" r:id="rId8"/>
     <p:sldId id="276" r:id="rId9"/>
     <p:sldId id="277" r:id="rId10"/>
+    <p:sldId id="625" r:id="rId11"/>
+    <p:sldId id="626" r:id="rId12"/>
+    <p:sldId id="627" r:id="rId13"/>
+    <p:sldId id="632" r:id="rId14"/>
+    <p:sldId id="628" r:id="rId15"/>
+    <p:sldId id="630" r:id="rId16"/>
+    <p:sldId id="629" r:id="rId17"/>
+    <p:sldId id="631" r:id="rId18"/>
   </p:sldIdLst>
   <p:sldSz cx="12192000" cy="6858000"/>
   <p:notesSz cx="6858000" cy="9144000"/>
@@ -267,7 +275,7 @@
           <a:p>
             <a:fld id="{44284D02-D543-4301-AE24-0EDEA54AB6B2}" type="datetimeFigureOut">
               <a:rPr lang="en-US" smtClean="0"/>
-              <a:t>6/11/2019</a:t>
+              <a:t>6/17/2019</a:t>
             </a:fld>
             <a:endParaRPr lang="en-US"/>
           </a:p>
@@ -465,7 +473,7 @@
           <a:p>
             <a:fld id="{44284D02-D543-4301-AE24-0EDEA54AB6B2}" type="datetimeFigureOut">
               <a:rPr lang="en-US" smtClean="0"/>
-              <a:t>6/11/2019</a:t>
+              <a:t>6/17/2019</a:t>
             </a:fld>
             <a:endParaRPr lang="en-US"/>
           </a:p>
@@ -673,7 +681,7 @@
           <a:p>
             <a:fld id="{44284D02-D543-4301-AE24-0EDEA54AB6B2}" type="datetimeFigureOut">
               <a:rPr lang="en-US" smtClean="0"/>
-              <a:t>6/11/2019</a:t>
+              <a:t>6/17/2019</a:t>
             </a:fld>
             <a:endParaRPr lang="en-US"/>
           </a:p>
@@ -871,7 +879,7 @@
           <a:p>
             <a:fld id="{44284D02-D543-4301-AE24-0EDEA54AB6B2}" type="datetimeFigureOut">
               <a:rPr lang="en-US" smtClean="0"/>
-              <a:t>6/11/2019</a:t>
+              <a:t>6/17/2019</a:t>
             </a:fld>
             <a:endParaRPr lang="en-US"/>
           </a:p>
@@ -1146,7 +1154,7 @@
           <a:p>
             <a:fld id="{44284D02-D543-4301-AE24-0EDEA54AB6B2}" type="datetimeFigureOut">
               <a:rPr lang="en-US" smtClean="0"/>
-              <a:t>6/11/2019</a:t>
+              <a:t>6/17/2019</a:t>
             </a:fld>
             <a:endParaRPr lang="en-US"/>
           </a:p>
@@ -1411,7 +1419,7 @@
           <a:p>
             <a:fld id="{44284D02-D543-4301-AE24-0EDEA54AB6B2}" type="datetimeFigureOut">
               <a:rPr lang="en-US" smtClean="0"/>
-              <a:t>6/11/2019</a:t>
+              <a:t>6/17/2019</a:t>
             </a:fld>
             <a:endParaRPr lang="en-US"/>
           </a:p>
@@ -1823,7 +1831,7 @@
           <a:p>
             <a:fld id="{44284D02-D543-4301-AE24-0EDEA54AB6B2}" type="datetimeFigureOut">
               <a:rPr lang="en-US" smtClean="0"/>
-              <a:t>6/11/2019</a:t>
+              <a:t>6/17/2019</a:t>
             </a:fld>
             <a:endParaRPr lang="en-US"/>
           </a:p>
@@ -1964,7 +1972,7 @@
           <a:p>
             <a:fld id="{44284D02-D543-4301-AE24-0EDEA54AB6B2}" type="datetimeFigureOut">
               <a:rPr lang="en-US" smtClean="0"/>
-              <a:t>6/11/2019</a:t>
+              <a:t>6/17/2019</a:t>
             </a:fld>
             <a:endParaRPr lang="en-US"/>
           </a:p>
@@ -2077,7 +2085,7 @@
           <a:p>
             <a:fld id="{44284D02-D543-4301-AE24-0EDEA54AB6B2}" type="datetimeFigureOut">
               <a:rPr lang="en-US" smtClean="0"/>
-              <a:t>6/11/2019</a:t>
+              <a:t>6/17/2019</a:t>
             </a:fld>
             <a:endParaRPr lang="en-US"/>
           </a:p>
@@ -2388,7 +2396,7 @@
           <a:p>
             <a:fld id="{44284D02-D543-4301-AE24-0EDEA54AB6B2}" type="datetimeFigureOut">
               <a:rPr lang="en-US" smtClean="0"/>
-              <a:t>6/11/2019</a:t>
+              <a:t>6/17/2019</a:t>
             </a:fld>
             <a:endParaRPr lang="en-US"/>
           </a:p>
@@ -2676,7 +2684,7 @@
           <a:p>
             <a:fld id="{44284D02-D543-4301-AE24-0EDEA54AB6B2}" type="datetimeFigureOut">
               <a:rPr lang="en-US" smtClean="0"/>
-              <a:t>6/11/2019</a:t>
+              <a:t>6/17/2019</a:t>
             </a:fld>
             <a:endParaRPr lang="en-US"/>
           </a:p>
@@ -2917,7 +2925,7 @@
           <a:p>
             <a:fld id="{44284D02-D543-4301-AE24-0EDEA54AB6B2}" type="datetimeFigureOut">
               <a:rPr lang="en-US" smtClean="0"/>
-              <a:t>6/11/2019</a:t>
+              <a:t>6/17/2019</a:t>
             </a:fld>
             <a:endParaRPr lang="en-US"/>
           </a:p>
@@ -3409,6 +3417,2492 @@
 </p:sld>
 </file>
 
+<file path=ppt/slides/slide10.xml><?xml version="1.0" encoding="utf-8"?>
+<p:sld xmlns:a="http://schemas.openxmlformats.org/drawingml/2006/main" xmlns:r="http://schemas.openxmlformats.org/officeDocument/2006/relationships" xmlns:p="http://schemas.openxmlformats.org/presentationml/2006/main">
+  <p:cSld>
+    <p:spTree>
+      <p:nvGrpSpPr>
+        <p:cNvPr id="1" name=""/>
+        <p:cNvGrpSpPr/>
+        <p:nvPr/>
+      </p:nvGrpSpPr>
+      <p:grpSpPr>
+        <a:xfrm>
+          <a:off x="0" y="0"/>
+          <a:ext cx="0" cy="0"/>
+          <a:chOff x="0" y="0"/>
+          <a:chExt cx="0" cy="0"/>
+        </a:xfrm>
+      </p:grpSpPr>
+      <p:sp>
+        <p:nvSpPr>
+          <p:cNvPr id="2" name="Title 1">
+            <a:extLst>
+              <a:ext uri="{FF2B5EF4-FFF2-40B4-BE49-F238E27FC236}">
+                <a16:creationId xmlns:a16="http://schemas.microsoft.com/office/drawing/2014/main" id="{1B3159BE-BC96-4676-8740-55ED999B4B88}"/>
+              </a:ext>
+            </a:extLst>
+          </p:cNvPr>
+          <p:cNvSpPr>
+            <a:spLocks noGrp="1"/>
+          </p:cNvSpPr>
+          <p:nvPr>
+            <p:ph type="title"/>
+          </p:nvPr>
+        </p:nvSpPr>
+        <p:spPr/>
+        <p:txBody>
+          <a:bodyPr/>
+          <a:lstStyle/>
+          <a:p>
+            <a:r>
+              <a:rPr lang="en-US" dirty="0"/>
+              <a:t>Strengths of BLEU</a:t>
+            </a:r>
+          </a:p>
+        </p:txBody>
+      </p:sp>
+      <p:sp>
+        <p:nvSpPr>
+          <p:cNvPr id="3" name="Content Placeholder 2">
+            <a:extLst>
+              <a:ext uri="{FF2B5EF4-FFF2-40B4-BE49-F238E27FC236}">
+                <a16:creationId xmlns:a16="http://schemas.microsoft.com/office/drawing/2014/main" id="{B044ACDA-F75C-4C68-8EA9-F984FE61E3CB}"/>
+              </a:ext>
+            </a:extLst>
+          </p:cNvPr>
+          <p:cNvSpPr>
+            <a:spLocks noGrp="1"/>
+          </p:cNvSpPr>
+          <p:nvPr>
+            <p:ph idx="1"/>
+          </p:nvPr>
+        </p:nvSpPr>
+        <p:spPr/>
+        <p:txBody>
+          <a:bodyPr/>
+          <a:lstStyle/>
+          <a:p>
+            <a:r>
+              <a:rPr lang="en-US" dirty="0"/>
+              <a:t>It’s fast and easy to calculate, especially compared to having human translators rate model output.</a:t>
+            </a:r>
+          </a:p>
+          <a:p>
+            <a:r>
+              <a:rPr lang="en-US" dirty="0"/>
+              <a:t>It’s ubiquitous. This makes it easy to compare your model to benchmarks on the same task.</a:t>
+            </a:r>
+          </a:p>
+          <a:p>
+            <a:pPr marL="0" indent="0">
+              <a:buNone/>
+            </a:pPr>
+            <a:endParaRPr lang="en-US" dirty="0"/>
+          </a:p>
+        </p:txBody>
+      </p:sp>
+      <p:pic>
+        <p:nvPicPr>
+          <p:cNvPr id="4" name="Picture 3">
+            <a:extLst>
+              <a:ext uri="{FF2B5EF4-FFF2-40B4-BE49-F238E27FC236}">
+                <a16:creationId xmlns:a16="http://schemas.microsoft.com/office/drawing/2014/main" id="{7408923D-35A2-4248-A0C1-D97564D13CFF}"/>
+              </a:ext>
+            </a:extLst>
+          </p:cNvPr>
+          <p:cNvPicPr>
+            <a:picLocks noChangeAspect="1"/>
+          </p:cNvPicPr>
+          <p:nvPr/>
+        </p:nvPicPr>
+        <p:blipFill>
+          <a:blip r:embed="rId2"/>
+          <a:stretch>
+            <a:fillRect/>
+          </a:stretch>
+        </p:blipFill>
+        <p:spPr>
+          <a:xfrm>
+            <a:off x="3761213" y="4149420"/>
+            <a:ext cx="7714712" cy="2103044"/>
+          </a:xfrm>
+          <a:prstGeom prst="rect">
+            <a:avLst/>
+          </a:prstGeom>
+          <a:ln>
+            <a:noFill/>
+          </a:ln>
+          <a:effectLst>
+            <a:outerShdw blurRad="292100" dist="139700" dir="2700000" algn="tl" rotWithShape="0">
+              <a:srgbClr val="333333">
+                <a:alpha val="65000"/>
+              </a:srgbClr>
+            </a:outerShdw>
+          </a:effectLst>
+        </p:spPr>
+      </p:pic>
+    </p:spTree>
+    <p:extLst>
+      <p:ext uri="{BB962C8B-B14F-4D97-AF65-F5344CB8AC3E}">
+        <p14:creationId xmlns:p14="http://schemas.microsoft.com/office/powerpoint/2010/main" val="3601151569"/>
+      </p:ext>
+    </p:extLst>
+  </p:cSld>
+  <p:clrMapOvr>
+    <a:masterClrMapping/>
+  </p:clrMapOvr>
+  <p:timing>
+    <p:tnLst>
+      <p:par>
+        <p:cTn id="1" dur="indefinite" restart="never" nodeType="tmRoot">
+          <p:childTnLst>
+            <p:seq concurrent="1" nextAc="seek">
+              <p:cTn id="2" dur="indefinite" nodeType="mainSeq">
+                <p:childTnLst>
+                  <p:par>
+                    <p:cTn id="3" fill="hold">
+                      <p:stCondLst>
+                        <p:cond delay="indefinite"/>
+                      </p:stCondLst>
+                      <p:childTnLst>
+                        <p:par>
+                          <p:cTn id="4" fill="hold">
+                            <p:stCondLst>
+                              <p:cond delay="0"/>
+                            </p:stCondLst>
+                            <p:childTnLst>
+                              <p:par>
+                                <p:cTn id="5" presetID="1" presetClass="entr" presetSubtype="0" fill="hold" grpId="0" nodeType="clickEffect">
+                                  <p:stCondLst>
+                                    <p:cond delay="0"/>
+                                  </p:stCondLst>
+                                  <p:childTnLst>
+                                    <p:set>
+                                      <p:cBhvr>
+                                        <p:cTn id="6" dur="1" fill="hold">
+                                          <p:stCondLst>
+                                            <p:cond delay="0"/>
+                                          </p:stCondLst>
+                                        </p:cTn>
+                                        <p:tgtEl>
+                                          <p:spTgt spid="3">
+                                            <p:txEl>
+                                              <p:pRg st="0" end="0"/>
+                                            </p:txEl>
+                                          </p:spTgt>
+                                        </p:tgtEl>
+                                        <p:attrNameLst>
+                                          <p:attrName>style.visibility</p:attrName>
+                                        </p:attrNameLst>
+                                      </p:cBhvr>
+                                      <p:to>
+                                        <p:strVal val="visible"/>
+                                      </p:to>
+                                    </p:set>
+                                  </p:childTnLst>
+                                </p:cTn>
+                              </p:par>
+                            </p:childTnLst>
+                          </p:cTn>
+                        </p:par>
+                      </p:childTnLst>
+                    </p:cTn>
+                  </p:par>
+                  <p:par>
+                    <p:cTn id="7" fill="hold">
+                      <p:stCondLst>
+                        <p:cond delay="indefinite"/>
+                      </p:stCondLst>
+                      <p:childTnLst>
+                        <p:par>
+                          <p:cTn id="8" fill="hold">
+                            <p:stCondLst>
+                              <p:cond delay="0"/>
+                            </p:stCondLst>
+                            <p:childTnLst>
+                              <p:par>
+                                <p:cTn id="9" presetID="1" presetClass="entr" presetSubtype="0" fill="hold" grpId="0" nodeType="clickEffect">
+                                  <p:stCondLst>
+                                    <p:cond delay="0"/>
+                                  </p:stCondLst>
+                                  <p:childTnLst>
+                                    <p:set>
+                                      <p:cBhvr>
+                                        <p:cTn id="10" dur="1" fill="hold">
+                                          <p:stCondLst>
+                                            <p:cond delay="0"/>
+                                          </p:stCondLst>
+                                        </p:cTn>
+                                        <p:tgtEl>
+                                          <p:spTgt spid="3">
+                                            <p:txEl>
+                                              <p:pRg st="1" end="1"/>
+                                            </p:txEl>
+                                          </p:spTgt>
+                                        </p:tgtEl>
+                                        <p:attrNameLst>
+                                          <p:attrName>style.visibility</p:attrName>
+                                        </p:attrNameLst>
+                                      </p:cBhvr>
+                                      <p:to>
+                                        <p:strVal val="visible"/>
+                                      </p:to>
+                                    </p:set>
+                                  </p:childTnLst>
+                                </p:cTn>
+                              </p:par>
+                            </p:childTnLst>
+                          </p:cTn>
+                        </p:par>
+                      </p:childTnLst>
+                    </p:cTn>
+                  </p:par>
+                </p:childTnLst>
+              </p:cTn>
+              <p:prevCondLst>
+                <p:cond evt="onPrev" delay="0">
+                  <p:tgtEl>
+                    <p:sldTgt/>
+                  </p:tgtEl>
+                </p:cond>
+              </p:prevCondLst>
+              <p:nextCondLst>
+                <p:cond evt="onNext" delay="0">
+                  <p:tgtEl>
+                    <p:sldTgt/>
+                  </p:tgtEl>
+                </p:cond>
+              </p:nextCondLst>
+            </p:seq>
+          </p:childTnLst>
+        </p:cTn>
+      </p:par>
+    </p:tnLst>
+    <p:bldLst>
+      <p:bldP spid="3" grpId="0" build="p"/>
+    </p:bldLst>
+  </p:timing>
+</p:sld>
+</file>
+
+<file path=ppt/slides/slide11.xml><?xml version="1.0" encoding="utf-8"?>
+<p:sld xmlns:a="http://schemas.openxmlformats.org/drawingml/2006/main" xmlns:r="http://schemas.openxmlformats.org/officeDocument/2006/relationships" xmlns:p="http://schemas.openxmlformats.org/presentationml/2006/main">
+  <p:cSld>
+    <p:spTree>
+      <p:nvGrpSpPr>
+        <p:cNvPr id="1" name=""/>
+        <p:cNvGrpSpPr/>
+        <p:nvPr/>
+      </p:nvGrpSpPr>
+      <p:grpSpPr>
+        <a:xfrm>
+          <a:off x="0" y="0"/>
+          <a:ext cx="0" cy="0"/>
+          <a:chOff x="0" y="0"/>
+          <a:chExt cx="0" cy="0"/>
+        </a:xfrm>
+      </p:grpSpPr>
+      <p:sp>
+        <p:nvSpPr>
+          <p:cNvPr id="2" name="Title 1">
+            <a:extLst>
+              <a:ext uri="{FF2B5EF4-FFF2-40B4-BE49-F238E27FC236}">
+                <a16:creationId xmlns:a16="http://schemas.microsoft.com/office/drawing/2014/main" id="{3ED65E85-58CB-4940-B7C3-A95A2DB51680}"/>
+              </a:ext>
+            </a:extLst>
+          </p:cNvPr>
+          <p:cNvSpPr>
+            <a:spLocks noGrp="1"/>
+          </p:cNvSpPr>
+          <p:nvPr>
+            <p:ph type="title"/>
+          </p:nvPr>
+        </p:nvSpPr>
+        <p:spPr/>
+        <p:txBody>
+          <a:bodyPr/>
+          <a:lstStyle/>
+          <a:p>
+            <a:r>
+              <a:rPr lang="en-US" dirty="0"/>
+              <a:t>Weaknesses of BLEU</a:t>
+            </a:r>
+          </a:p>
+        </p:txBody>
+      </p:sp>
+      <p:sp>
+        <p:nvSpPr>
+          <p:cNvPr id="3" name="Content Placeholder 2">
+            <a:extLst>
+              <a:ext uri="{FF2B5EF4-FFF2-40B4-BE49-F238E27FC236}">
+                <a16:creationId xmlns:a16="http://schemas.microsoft.com/office/drawing/2014/main" id="{1C823E15-A1CF-4D71-AAA9-FF75F79A79B0}"/>
+              </a:ext>
+            </a:extLst>
+          </p:cNvPr>
+          <p:cNvSpPr>
+            <a:spLocks noGrp="1"/>
+          </p:cNvSpPr>
+          <p:nvPr>
+            <p:ph idx="1"/>
+          </p:nvPr>
+        </p:nvSpPr>
+        <p:spPr/>
+        <p:txBody>
+          <a:bodyPr>
+            <a:normAutofit lnSpcReduction="10000"/>
+          </a:bodyPr>
+          <a:lstStyle/>
+          <a:p>
+            <a:r>
+              <a:rPr lang="en-US" sz="3200" dirty="0"/>
+              <a:t>It doesn’t consider meaning</a:t>
+            </a:r>
+          </a:p>
+          <a:p>
+            <a:pPr lvl="1"/>
+            <a:r>
+              <a:rPr lang="en-US" sz="3200" dirty="0">
+                <a:solidFill>
+                  <a:schemeClr val="bg1">
+                    <a:lumMod val="50000"/>
+                  </a:schemeClr>
+                </a:solidFill>
+              </a:rPr>
+              <a:t>Correct: I ate the apple.</a:t>
+            </a:r>
+          </a:p>
+          <a:p>
+            <a:pPr lvl="1"/>
+            <a:r>
+              <a:rPr lang="en-US" sz="3200" dirty="0">
+                <a:solidFill>
+                  <a:schemeClr val="bg1">
+                    <a:lumMod val="50000"/>
+                  </a:schemeClr>
+                </a:solidFill>
+              </a:rPr>
+              <a:t>These wrong sentences all have same BLEU score:</a:t>
+            </a:r>
+          </a:p>
+          <a:p>
+            <a:pPr lvl="2"/>
+            <a:r>
+              <a:rPr lang="en-US" sz="2800" dirty="0">
+                <a:solidFill>
+                  <a:schemeClr val="bg1">
+                    <a:lumMod val="50000"/>
+                  </a:schemeClr>
+                </a:solidFill>
+              </a:rPr>
+              <a:t>I ate an apple.</a:t>
+            </a:r>
+          </a:p>
+          <a:p>
+            <a:pPr lvl="2"/>
+            <a:r>
+              <a:rPr lang="en-US" sz="2800" dirty="0">
+                <a:solidFill>
+                  <a:schemeClr val="bg1">
+                    <a:lumMod val="50000"/>
+                  </a:schemeClr>
+                </a:solidFill>
+              </a:rPr>
+              <a:t>I consumed the apple.</a:t>
+            </a:r>
+          </a:p>
+          <a:p>
+            <a:pPr lvl="2"/>
+            <a:r>
+              <a:rPr lang="en-US" sz="2800" dirty="0">
+                <a:solidFill>
+                  <a:schemeClr val="bg1">
+                    <a:lumMod val="50000"/>
+                  </a:schemeClr>
+                </a:solidFill>
+              </a:rPr>
+              <a:t>I ate the potato.</a:t>
+            </a:r>
+          </a:p>
+          <a:p>
+            <a:r>
+              <a:rPr lang="en-US" sz="3200" dirty="0"/>
+              <a:t>It doesn’t directly consider sentence structure</a:t>
+            </a:r>
+          </a:p>
+          <a:p>
+            <a:r>
+              <a:rPr lang="en-US" sz="3200" dirty="0"/>
+              <a:t>It doesn’t handle morphologically rich languages well</a:t>
+            </a:r>
+          </a:p>
+          <a:p>
+            <a:r>
+              <a:rPr lang="en-US" sz="3200" dirty="0"/>
+              <a:t>It doesn’t map well to human judgements</a:t>
+            </a:r>
+          </a:p>
+          <a:p>
+            <a:endParaRPr lang="en-US" dirty="0"/>
+          </a:p>
+        </p:txBody>
+      </p:sp>
+      <p:pic>
+        <p:nvPicPr>
+          <p:cNvPr id="4" name="Picture 3">
+            <a:extLst>
+              <a:ext uri="{FF2B5EF4-FFF2-40B4-BE49-F238E27FC236}">
+                <a16:creationId xmlns:a16="http://schemas.microsoft.com/office/drawing/2014/main" id="{FB793404-C56A-4438-BA61-51F8D6AF0C2B}"/>
+              </a:ext>
+            </a:extLst>
+          </p:cNvPr>
+          <p:cNvPicPr>
+            <a:picLocks noChangeAspect="1"/>
+          </p:cNvPicPr>
+          <p:nvPr/>
+        </p:nvPicPr>
+        <p:blipFill>
+          <a:blip r:embed="rId2"/>
+          <a:stretch>
+            <a:fillRect/>
+          </a:stretch>
+        </p:blipFill>
+        <p:spPr>
+          <a:xfrm>
+            <a:off x="5947794" y="223373"/>
+            <a:ext cx="5972748" cy="1628181"/>
+          </a:xfrm>
+          <a:prstGeom prst="rect">
+            <a:avLst/>
+          </a:prstGeom>
+          <a:ln>
+            <a:noFill/>
+          </a:ln>
+          <a:effectLst>
+            <a:outerShdw blurRad="292100" dist="139700" dir="2700000" algn="tl" rotWithShape="0">
+              <a:srgbClr val="333333">
+                <a:alpha val="65000"/>
+              </a:srgbClr>
+            </a:outerShdw>
+          </a:effectLst>
+        </p:spPr>
+      </p:pic>
+    </p:spTree>
+    <p:extLst>
+      <p:ext uri="{BB962C8B-B14F-4D97-AF65-F5344CB8AC3E}">
+        <p14:creationId xmlns:p14="http://schemas.microsoft.com/office/powerpoint/2010/main" val="395491437"/>
+      </p:ext>
+    </p:extLst>
+  </p:cSld>
+  <p:clrMapOvr>
+    <a:masterClrMapping/>
+  </p:clrMapOvr>
+  <p:timing>
+    <p:tnLst>
+      <p:par>
+        <p:cTn id="1" dur="indefinite" restart="never" nodeType="tmRoot">
+          <p:childTnLst>
+            <p:seq concurrent="1" nextAc="seek">
+              <p:cTn id="2" dur="indefinite" nodeType="mainSeq">
+                <p:childTnLst>
+                  <p:par>
+                    <p:cTn id="3" fill="hold">
+                      <p:stCondLst>
+                        <p:cond delay="indefinite"/>
+                      </p:stCondLst>
+                      <p:childTnLst>
+                        <p:par>
+                          <p:cTn id="4" fill="hold">
+                            <p:stCondLst>
+                              <p:cond delay="0"/>
+                            </p:stCondLst>
+                            <p:childTnLst>
+                              <p:par>
+                                <p:cTn id="5" presetID="1" presetClass="entr" presetSubtype="0" fill="hold" grpId="0" nodeType="clickEffect">
+                                  <p:stCondLst>
+                                    <p:cond delay="0"/>
+                                  </p:stCondLst>
+                                  <p:childTnLst>
+                                    <p:set>
+                                      <p:cBhvr>
+                                        <p:cTn id="6" dur="1" fill="hold">
+                                          <p:stCondLst>
+                                            <p:cond delay="0"/>
+                                          </p:stCondLst>
+                                        </p:cTn>
+                                        <p:tgtEl>
+                                          <p:spTgt spid="3">
+                                            <p:txEl>
+                                              <p:pRg st="0" end="0"/>
+                                            </p:txEl>
+                                          </p:spTgt>
+                                        </p:tgtEl>
+                                        <p:attrNameLst>
+                                          <p:attrName>style.visibility</p:attrName>
+                                        </p:attrNameLst>
+                                      </p:cBhvr>
+                                      <p:to>
+                                        <p:strVal val="visible"/>
+                                      </p:to>
+                                    </p:set>
+                                  </p:childTnLst>
+                                </p:cTn>
+                              </p:par>
+                              <p:par>
+                                <p:cTn id="7" presetID="1" presetClass="entr" presetSubtype="0" fill="hold" grpId="0" nodeType="withEffect">
+                                  <p:stCondLst>
+                                    <p:cond delay="0"/>
+                                  </p:stCondLst>
+                                  <p:childTnLst>
+                                    <p:set>
+                                      <p:cBhvr>
+                                        <p:cTn id="8" dur="1" fill="hold">
+                                          <p:stCondLst>
+                                            <p:cond delay="0"/>
+                                          </p:stCondLst>
+                                        </p:cTn>
+                                        <p:tgtEl>
+                                          <p:spTgt spid="3">
+                                            <p:txEl>
+                                              <p:pRg st="1" end="1"/>
+                                            </p:txEl>
+                                          </p:spTgt>
+                                        </p:tgtEl>
+                                        <p:attrNameLst>
+                                          <p:attrName>style.visibility</p:attrName>
+                                        </p:attrNameLst>
+                                      </p:cBhvr>
+                                      <p:to>
+                                        <p:strVal val="visible"/>
+                                      </p:to>
+                                    </p:set>
+                                  </p:childTnLst>
+                                </p:cTn>
+                              </p:par>
+                            </p:childTnLst>
+                          </p:cTn>
+                        </p:par>
+                      </p:childTnLst>
+                    </p:cTn>
+                  </p:par>
+                  <p:par>
+                    <p:cTn id="9" fill="hold">
+                      <p:stCondLst>
+                        <p:cond delay="indefinite"/>
+                      </p:stCondLst>
+                      <p:childTnLst>
+                        <p:par>
+                          <p:cTn id="10" fill="hold">
+                            <p:stCondLst>
+                              <p:cond delay="0"/>
+                            </p:stCondLst>
+                            <p:childTnLst>
+                              <p:par>
+                                <p:cTn id="11" presetID="1" presetClass="entr" presetSubtype="0" fill="hold" grpId="0" nodeType="clickEffect">
+                                  <p:stCondLst>
+                                    <p:cond delay="0"/>
+                                  </p:stCondLst>
+                                  <p:childTnLst>
+                                    <p:set>
+                                      <p:cBhvr>
+                                        <p:cTn id="12" dur="1" fill="hold">
+                                          <p:stCondLst>
+                                            <p:cond delay="0"/>
+                                          </p:stCondLst>
+                                        </p:cTn>
+                                        <p:tgtEl>
+                                          <p:spTgt spid="3">
+                                            <p:txEl>
+                                              <p:pRg st="2" end="2"/>
+                                            </p:txEl>
+                                          </p:spTgt>
+                                        </p:tgtEl>
+                                        <p:attrNameLst>
+                                          <p:attrName>style.visibility</p:attrName>
+                                        </p:attrNameLst>
+                                      </p:cBhvr>
+                                      <p:to>
+                                        <p:strVal val="visible"/>
+                                      </p:to>
+                                    </p:set>
+                                  </p:childTnLst>
+                                </p:cTn>
+                              </p:par>
+                            </p:childTnLst>
+                          </p:cTn>
+                        </p:par>
+                      </p:childTnLst>
+                    </p:cTn>
+                  </p:par>
+                  <p:par>
+                    <p:cTn id="13" fill="hold">
+                      <p:stCondLst>
+                        <p:cond delay="indefinite"/>
+                      </p:stCondLst>
+                      <p:childTnLst>
+                        <p:par>
+                          <p:cTn id="14" fill="hold">
+                            <p:stCondLst>
+                              <p:cond delay="0"/>
+                            </p:stCondLst>
+                            <p:childTnLst>
+                              <p:par>
+                                <p:cTn id="15" presetID="1" presetClass="entr" presetSubtype="0" fill="hold" grpId="0" nodeType="clickEffect">
+                                  <p:stCondLst>
+                                    <p:cond delay="0"/>
+                                  </p:stCondLst>
+                                  <p:childTnLst>
+                                    <p:set>
+                                      <p:cBhvr>
+                                        <p:cTn id="16" dur="1" fill="hold">
+                                          <p:stCondLst>
+                                            <p:cond delay="0"/>
+                                          </p:stCondLst>
+                                        </p:cTn>
+                                        <p:tgtEl>
+                                          <p:spTgt spid="3">
+                                            <p:txEl>
+                                              <p:pRg st="3" end="3"/>
+                                            </p:txEl>
+                                          </p:spTgt>
+                                        </p:tgtEl>
+                                        <p:attrNameLst>
+                                          <p:attrName>style.visibility</p:attrName>
+                                        </p:attrNameLst>
+                                      </p:cBhvr>
+                                      <p:to>
+                                        <p:strVal val="visible"/>
+                                      </p:to>
+                                    </p:set>
+                                  </p:childTnLst>
+                                </p:cTn>
+                              </p:par>
+                            </p:childTnLst>
+                          </p:cTn>
+                        </p:par>
+                      </p:childTnLst>
+                    </p:cTn>
+                  </p:par>
+                  <p:par>
+                    <p:cTn id="17" fill="hold">
+                      <p:stCondLst>
+                        <p:cond delay="indefinite"/>
+                      </p:stCondLst>
+                      <p:childTnLst>
+                        <p:par>
+                          <p:cTn id="18" fill="hold">
+                            <p:stCondLst>
+                              <p:cond delay="0"/>
+                            </p:stCondLst>
+                            <p:childTnLst>
+                              <p:par>
+                                <p:cTn id="19" presetID="1" presetClass="entr" presetSubtype="0" fill="hold" grpId="0" nodeType="clickEffect">
+                                  <p:stCondLst>
+                                    <p:cond delay="0"/>
+                                  </p:stCondLst>
+                                  <p:childTnLst>
+                                    <p:set>
+                                      <p:cBhvr>
+                                        <p:cTn id="20" dur="1" fill="hold">
+                                          <p:stCondLst>
+                                            <p:cond delay="0"/>
+                                          </p:stCondLst>
+                                        </p:cTn>
+                                        <p:tgtEl>
+                                          <p:spTgt spid="3">
+                                            <p:txEl>
+                                              <p:pRg st="4" end="4"/>
+                                            </p:txEl>
+                                          </p:spTgt>
+                                        </p:tgtEl>
+                                        <p:attrNameLst>
+                                          <p:attrName>style.visibility</p:attrName>
+                                        </p:attrNameLst>
+                                      </p:cBhvr>
+                                      <p:to>
+                                        <p:strVal val="visible"/>
+                                      </p:to>
+                                    </p:set>
+                                  </p:childTnLst>
+                                </p:cTn>
+                              </p:par>
+                            </p:childTnLst>
+                          </p:cTn>
+                        </p:par>
+                      </p:childTnLst>
+                    </p:cTn>
+                  </p:par>
+                  <p:par>
+                    <p:cTn id="21" fill="hold">
+                      <p:stCondLst>
+                        <p:cond delay="indefinite"/>
+                      </p:stCondLst>
+                      <p:childTnLst>
+                        <p:par>
+                          <p:cTn id="22" fill="hold">
+                            <p:stCondLst>
+                              <p:cond delay="0"/>
+                            </p:stCondLst>
+                            <p:childTnLst>
+                              <p:par>
+                                <p:cTn id="23" presetID="1" presetClass="entr" presetSubtype="0" fill="hold" grpId="0" nodeType="clickEffect">
+                                  <p:stCondLst>
+                                    <p:cond delay="0"/>
+                                  </p:stCondLst>
+                                  <p:childTnLst>
+                                    <p:set>
+                                      <p:cBhvr>
+                                        <p:cTn id="24" dur="1" fill="hold">
+                                          <p:stCondLst>
+                                            <p:cond delay="0"/>
+                                          </p:stCondLst>
+                                        </p:cTn>
+                                        <p:tgtEl>
+                                          <p:spTgt spid="3">
+                                            <p:txEl>
+                                              <p:pRg st="5" end="5"/>
+                                            </p:txEl>
+                                          </p:spTgt>
+                                        </p:tgtEl>
+                                        <p:attrNameLst>
+                                          <p:attrName>style.visibility</p:attrName>
+                                        </p:attrNameLst>
+                                      </p:cBhvr>
+                                      <p:to>
+                                        <p:strVal val="visible"/>
+                                      </p:to>
+                                    </p:set>
+                                  </p:childTnLst>
+                                </p:cTn>
+                              </p:par>
+                            </p:childTnLst>
+                          </p:cTn>
+                        </p:par>
+                      </p:childTnLst>
+                    </p:cTn>
+                  </p:par>
+                  <p:par>
+                    <p:cTn id="25" fill="hold">
+                      <p:stCondLst>
+                        <p:cond delay="indefinite"/>
+                      </p:stCondLst>
+                      <p:childTnLst>
+                        <p:par>
+                          <p:cTn id="26" fill="hold">
+                            <p:stCondLst>
+                              <p:cond delay="0"/>
+                            </p:stCondLst>
+                            <p:childTnLst>
+                              <p:par>
+                                <p:cTn id="27" presetID="1" presetClass="entr" presetSubtype="0" fill="hold" grpId="0" nodeType="clickEffect">
+                                  <p:stCondLst>
+                                    <p:cond delay="0"/>
+                                  </p:stCondLst>
+                                  <p:childTnLst>
+                                    <p:set>
+                                      <p:cBhvr>
+                                        <p:cTn id="28" dur="1" fill="hold">
+                                          <p:stCondLst>
+                                            <p:cond delay="0"/>
+                                          </p:stCondLst>
+                                        </p:cTn>
+                                        <p:tgtEl>
+                                          <p:spTgt spid="3">
+                                            <p:txEl>
+                                              <p:pRg st="6" end="6"/>
+                                            </p:txEl>
+                                          </p:spTgt>
+                                        </p:tgtEl>
+                                        <p:attrNameLst>
+                                          <p:attrName>style.visibility</p:attrName>
+                                        </p:attrNameLst>
+                                      </p:cBhvr>
+                                      <p:to>
+                                        <p:strVal val="visible"/>
+                                      </p:to>
+                                    </p:set>
+                                  </p:childTnLst>
+                                </p:cTn>
+                              </p:par>
+                            </p:childTnLst>
+                          </p:cTn>
+                        </p:par>
+                      </p:childTnLst>
+                    </p:cTn>
+                  </p:par>
+                  <p:par>
+                    <p:cTn id="29" fill="hold">
+                      <p:stCondLst>
+                        <p:cond delay="indefinite"/>
+                      </p:stCondLst>
+                      <p:childTnLst>
+                        <p:par>
+                          <p:cTn id="30" fill="hold">
+                            <p:stCondLst>
+                              <p:cond delay="0"/>
+                            </p:stCondLst>
+                            <p:childTnLst>
+                              <p:par>
+                                <p:cTn id="31" presetID="1" presetClass="entr" presetSubtype="0" fill="hold" grpId="0" nodeType="clickEffect">
+                                  <p:stCondLst>
+                                    <p:cond delay="0"/>
+                                  </p:stCondLst>
+                                  <p:childTnLst>
+                                    <p:set>
+                                      <p:cBhvr>
+                                        <p:cTn id="32" dur="1" fill="hold">
+                                          <p:stCondLst>
+                                            <p:cond delay="0"/>
+                                          </p:stCondLst>
+                                        </p:cTn>
+                                        <p:tgtEl>
+                                          <p:spTgt spid="3">
+                                            <p:txEl>
+                                              <p:pRg st="7" end="7"/>
+                                            </p:txEl>
+                                          </p:spTgt>
+                                        </p:tgtEl>
+                                        <p:attrNameLst>
+                                          <p:attrName>style.visibility</p:attrName>
+                                        </p:attrNameLst>
+                                      </p:cBhvr>
+                                      <p:to>
+                                        <p:strVal val="visible"/>
+                                      </p:to>
+                                    </p:set>
+                                  </p:childTnLst>
+                                </p:cTn>
+                              </p:par>
+                            </p:childTnLst>
+                          </p:cTn>
+                        </p:par>
+                      </p:childTnLst>
+                    </p:cTn>
+                  </p:par>
+                  <p:par>
+                    <p:cTn id="33" fill="hold">
+                      <p:stCondLst>
+                        <p:cond delay="indefinite"/>
+                      </p:stCondLst>
+                      <p:childTnLst>
+                        <p:par>
+                          <p:cTn id="34" fill="hold">
+                            <p:stCondLst>
+                              <p:cond delay="0"/>
+                            </p:stCondLst>
+                            <p:childTnLst>
+                              <p:par>
+                                <p:cTn id="35" presetID="1" presetClass="entr" presetSubtype="0" fill="hold" grpId="0" nodeType="clickEffect">
+                                  <p:stCondLst>
+                                    <p:cond delay="0"/>
+                                  </p:stCondLst>
+                                  <p:childTnLst>
+                                    <p:set>
+                                      <p:cBhvr>
+                                        <p:cTn id="36" dur="1" fill="hold">
+                                          <p:stCondLst>
+                                            <p:cond delay="0"/>
+                                          </p:stCondLst>
+                                        </p:cTn>
+                                        <p:tgtEl>
+                                          <p:spTgt spid="3">
+                                            <p:txEl>
+                                              <p:pRg st="8" end="8"/>
+                                            </p:txEl>
+                                          </p:spTgt>
+                                        </p:tgtEl>
+                                        <p:attrNameLst>
+                                          <p:attrName>style.visibility</p:attrName>
+                                        </p:attrNameLst>
+                                      </p:cBhvr>
+                                      <p:to>
+                                        <p:strVal val="visible"/>
+                                      </p:to>
+                                    </p:set>
+                                  </p:childTnLst>
+                                </p:cTn>
+                              </p:par>
+                            </p:childTnLst>
+                          </p:cTn>
+                        </p:par>
+                      </p:childTnLst>
+                    </p:cTn>
+                  </p:par>
+                </p:childTnLst>
+              </p:cTn>
+              <p:prevCondLst>
+                <p:cond evt="onPrev" delay="0">
+                  <p:tgtEl>
+                    <p:sldTgt/>
+                  </p:tgtEl>
+                </p:cond>
+              </p:prevCondLst>
+              <p:nextCondLst>
+                <p:cond evt="onNext" delay="0">
+                  <p:tgtEl>
+                    <p:sldTgt/>
+                  </p:tgtEl>
+                </p:cond>
+              </p:nextCondLst>
+            </p:seq>
+          </p:childTnLst>
+        </p:cTn>
+      </p:par>
+    </p:tnLst>
+    <p:bldLst>
+      <p:bldP spid="3" grpId="0" uiExpand="1" build="p"/>
+    </p:bldLst>
+  </p:timing>
+</p:sld>
+</file>
+
+<file path=ppt/slides/slide12.xml><?xml version="1.0" encoding="utf-8"?>
+<p:sld xmlns:a="http://schemas.openxmlformats.org/drawingml/2006/main" xmlns:r="http://schemas.openxmlformats.org/officeDocument/2006/relationships" xmlns:p="http://schemas.openxmlformats.org/presentationml/2006/main">
+  <p:cSld>
+    <p:spTree>
+      <p:nvGrpSpPr>
+        <p:cNvPr id="1" name=""/>
+        <p:cNvGrpSpPr/>
+        <p:nvPr/>
+      </p:nvGrpSpPr>
+      <p:grpSpPr>
+        <a:xfrm>
+          <a:off x="0" y="0"/>
+          <a:ext cx="0" cy="0"/>
+          <a:chOff x="0" y="0"/>
+          <a:chExt cx="0" cy="0"/>
+        </a:xfrm>
+      </p:grpSpPr>
+      <p:sp>
+        <p:nvSpPr>
+          <p:cNvPr id="3" name="Content Placeholder 2">
+            <a:extLst>
+              <a:ext uri="{FF2B5EF4-FFF2-40B4-BE49-F238E27FC236}">
+                <a16:creationId xmlns:a16="http://schemas.microsoft.com/office/drawing/2014/main" id="{9A50CE51-9AB2-446A-8039-52BB5B729091}"/>
+              </a:ext>
+            </a:extLst>
+          </p:cNvPr>
+          <p:cNvSpPr>
+            <a:spLocks noGrp="1"/>
+          </p:cNvSpPr>
+          <p:nvPr>
+            <p:ph idx="1"/>
+          </p:nvPr>
+        </p:nvSpPr>
+        <p:spPr>
+          <a:xfrm>
+            <a:off x="779477" y="530591"/>
+            <a:ext cx="10515600" cy="4038279"/>
+          </a:xfrm>
+        </p:spPr>
+        <p:txBody>
+          <a:bodyPr>
+            <a:normAutofit lnSpcReduction="10000"/>
+          </a:bodyPr>
+          <a:lstStyle/>
+          <a:p>
+            <a:r>
+              <a:rPr lang="en-US" sz="3200" dirty="0"/>
+              <a:t>For systems going into production, do at least one round of system evaluation with human experts.</a:t>
+            </a:r>
+          </a:p>
+          <a:p>
+            <a:r>
+              <a:rPr lang="en-US" sz="3200" dirty="0"/>
+              <a:t>Before you get to that round, you’ll probably need to use at least one automatic evaluation metric. Use BLEU if and only if:</a:t>
+            </a:r>
+          </a:p>
+          <a:p>
+            <a:pPr marL="914400" lvl="1" indent="-457200">
+              <a:buFont typeface="+mj-lt"/>
+              <a:buAutoNum type="arabicPeriod"/>
+            </a:pPr>
+            <a:r>
+              <a:rPr lang="en-US" sz="3200" dirty="0"/>
+              <a:t>You’re doing machine translation AND</a:t>
+            </a:r>
+          </a:p>
+          <a:p>
+            <a:pPr marL="914400" lvl="1" indent="-457200">
+              <a:buFont typeface="+mj-lt"/>
+              <a:buAutoNum type="arabicPeriod"/>
+            </a:pPr>
+            <a:r>
+              <a:rPr lang="en-US" sz="3200" dirty="0"/>
+              <a:t>You’re evaluating across an entire corpus AND</a:t>
+            </a:r>
+          </a:p>
+          <a:p>
+            <a:pPr marL="914400" lvl="1" indent="-457200">
+              <a:buFont typeface="+mj-lt"/>
+              <a:buAutoNum type="arabicPeriod"/>
+            </a:pPr>
+            <a:r>
+              <a:rPr lang="en-US" sz="3200" dirty="0"/>
+              <a:t>You know the limitations of the metric and you’re prepared to accept them.</a:t>
+            </a:r>
+          </a:p>
+          <a:p>
+            <a:endParaRPr lang="en-US" dirty="0"/>
+          </a:p>
+        </p:txBody>
+      </p:sp>
+      <p:pic>
+        <p:nvPicPr>
+          <p:cNvPr id="4" name="Picture 3">
+            <a:extLst>
+              <a:ext uri="{FF2B5EF4-FFF2-40B4-BE49-F238E27FC236}">
+                <a16:creationId xmlns:a16="http://schemas.microsoft.com/office/drawing/2014/main" id="{643527E3-2D40-4FCA-91C9-7D4CBEB1252C}"/>
+              </a:ext>
+            </a:extLst>
+          </p:cNvPr>
+          <p:cNvPicPr>
+            <a:picLocks noChangeAspect="1"/>
+          </p:cNvPicPr>
+          <p:nvPr/>
+        </p:nvPicPr>
+        <p:blipFill>
+          <a:blip r:embed="rId2"/>
+          <a:stretch>
+            <a:fillRect/>
+          </a:stretch>
+        </p:blipFill>
+        <p:spPr>
+          <a:xfrm>
+            <a:off x="4563610" y="4648106"/>
+            <a:ext cx="7424043" cy="2023807"/>
+          </a:xfrm>
+          <a:prstGeom prst="rect">
+            <a:avLst/>
+          </a:prstGeom>
+          <a:ln>
+            <a:noFill/>
+          </a:ln>
+          <a:effectLst>
+            <a:outerShdw blurRad="292100" dist="139700" dir="2700000" algn="tl" rotWithShape="0">
+              <a:srgbClr val="333333">
+                <a:alpha val="65000"/>
+              </a:srgbClr>
+            </a:outerShdw>
+          </a:effectLst>
+        </p:spPr>
+      </p:pic>
+    </p:spTree>
+    <p:extLst>
+      <p:ext uri="{BB962C8B-B14F-4D97-AF65-F5344CB8AC3E}">
+        <p14:creationId xmlns:p14="http://schemas.microsoft.com/office/powerpoint/2010/main" val="380598664"/>
+      </p:ext>
+    </p:extLst>
+  </p:cSld>
+  <p:clrMapOvr>
+    <a:masterClrMapping/>
+  </p:clrMapOvr>
+  <p:timing>
+    <p:tnLst>
+      <p:par>
+        <p:cTn id="1" dur="indefinite" restart="never" nodeType="tmRoot">
+          <p:childTnLst>
+            <p:seq concurrent="1" nextAc="seek">
+              <p:cTn id="2" dur="indefinite" nodeType="mainSeq">
+                <p:childTnLst>
+                  <p:par>
+                    <p:cTn id="3" fill="hold">
+                      <p:stCondLst>
+                        <p:cond delay="indefinite"/>
+                      </p:stCondLst>
+                      <p:childTnLst>
+                        <p:par>
+                          <p:cTn id="4" fill="hold">
+                            <p:stCondLst>
+                              <p:cond delay="0"/>
+                            </p:stCondLst>
+                            <p:childTnLst>
+                              <p:par>
+                                <p:cTn id="5" presetID="1" presetClass="entr" presetSubtype="0" fill="hold" grpId="0" nodeType="clickEffect">
+                                  <p:stCondLst>
+                                    <p:cond delay="0"/>
+                                  </p:stCondLst>
+                                  <p:childTnLst>
+                                    <p:set>
+                                      <p:cBhvr>
+                                        <p:cTn id="6" dur="1" fill="hold">
+                                          <p:stCondLst>
+                                            <p:cond delay="0"/>
+                                          </p:stCondLst>
+                                        </p:cTn>
+                                        <p:tgtEl>
+                                          <p:spTgt spid="3">
+                                            <p:txEl>
+                                              <p:pRg st="0" end="0"/>
+                                            </p:txEl>
+                                          </p:spTgt>
+                                        </p:tgtEl>
+                                        <p:attrNameLst>
+                                          <p:attrName>style.visibility</p:attrName>
+                                        </p:attrNameLst>
+                                      </p:cBhvr>
+                                      <p:to>
+                                        <p:strVal val="visible"/>
+                                      </p:to>
+                                    </p:set>
+                                  </p:childTnLst>
+                                </p:cTn>
+                              </p:par>
+                            </p:childTnLst>
+                          </p:cTn>
+                        </p:par>
+                      </p:childTnLst>
+                    </p:cTn>
+                  </p:par>
+                  <p:par>
+                    <p:cTn id="7" fill="hold">
+                      <p:stCondLst>
+                        <p:cond delay="indefinite"/>
+                      </p:stCondLst>
+                      <p:childTnLst>
+                        <p:par>
+                          <p:cTn id="8" fill="hold">
+                            <p:stCondLst>
+                              <p:cond delay="0"/>
+                            </p:stCondLst>
+                            <p:childTnLst>
+                              <p:par>
+                                <p:cTn id="9" presetID="1" presetClass="entr" presetSubtype="0" fill="hold" grpId="0" nodeType="clickEffect">
+                                  <p:stCondLst>
+                                    <p:cond delay="0"/>
+                                  </p:stCondLst>
+                                  <p:childTnLst>
+                                    <p:set>
+                                      <p:cBhvr>
+                                        <p:cTn id="10" dur="1" fill="hold">
+                                          <p:stCondLst>
+                                            <p:cond delay="0"/>
+                                          </p:stCondLst>
+                                        </p:cTn>
+                                        <p:tgtEl>
+                                          <p:spTgt spid="3">
+                                            <p:txEl>
+                                              <p:pRg st="1" end="1"/>
+                                            </p:txEl>
+                                          </p:spTgt>
+                                        </p:tgtEl>
+                                        <p:attrNameLst>
+                                          <p:attrName>style.visibility</p:attrName>
+                                        </p:attrNameLst>
+                                      </p:cBhvr>
+                                      <p:to>
+                                        <p:strVal val="visible"/>
+                                      </p:to>
+                                    </p:set>
+                                  </p:childTnLst>
+                                </p:cTn>
+                              </p:par>
+                            </p:childTnLst>
+                          </p:cTn>
+                        </p:par>
+                      </p:childTnLst>
+                    </p:cTn>
+                  </p:par>
+                  <p:par>
+                    <p:cTn id="11" fill="hold">
+                      <p:stCondLst>
+                        <p:cond delay="indefinite"/>
+                      </p:stCondLst>
+                      <p:childTnLst>
+                        <p:par>
+                          <p:cTn id="12" fill="hold">
+                            <p:stCondLst>
+                              <p:cond delay="0"/>
+                            </p:stCondLst>
+                            <p:childTnLst>
+                              <p:par>
+                                <p:cTn id="13" presetID="1" presetClass="entr" presetSubtype="0" fill="hold" grpId="0" nodeType="clickEffect">
+                                  <p:stCondLst>
+                                    <p:cond delay="0"/>
+                                  </p:stCondLst>
+                                  <p:childTnLst>
+                                    <p:set>
+                                      <p:cBhvr>
+                                        <p:cTn id="14" dur="1" fill="hold">
+                                          <p:stCondLst>
+                                            <p:cond delay="0"/>
+                                          </p:stCondLst>
+                                        </p:cTn>
+                                        <p:tgtEl>
+                                          <p:spTgt spid="3">
+                                            <p:txEl>
+                                              <p:pRg st="2" end="2"/>
+                                            </p:txEl>
+                                          </p:spTgt>
+                                        </p:tgtEl>
+                                        <p:attrNameLst>
+                                          <p:attrName>style.visibility</p:attrName>
+                                        </p:attrNameLst>
+                                      </p:cBhvr>
+                                      <p:to>
+                                        <p:strVal val="visible"/>
+                                      </p:to>
+                                    </p:set>
+                                  </p:childTnLst>
+                                </p:cTn>
+                              </p:par>
+                            </p:childTnLst>
+                          </p:cTn>
+                        </p:par>
+                      </p:childTnLst>
+                    </p:cTn>
+                  </p:par>
+                  <p:par>
+                    <p:cTn id="15" fill="hold">
+                      <p:stCondLst>
+                        <p:cond delay="indefinite"/>
+                      </p:stCondLst>
+                      <p:childTnLst>
+                        <p:par>
+                          <p:cTn id="16" fill="hold">
+                            <p:stCondLst>
+                              <p:cond delay="0"/>
+                            </p:stCondLst>
+                            <p:childTnLst>
+                              <p:par>
+                                <p:cTn id="17" presetID="1" presetClass="entr" presetSubtype="0" fill="hold" grpId="0" nodeType="clickEffect">
+                                  <p:stCondLst>
+                                    <p:cond delay="0"/>
+                                  </p:stCondLst>
+                                  <p:childTnLst>
+                                    <p:set>
+                                      <p:cBhvr>
+                                        <p:cTn id="18" dur="1" fill="hold">
+                                          <p:stCondLst>
+                                            <p:cond delay="0"/>
+                                          </p:stCondLst>
+                                        </p:cTn>
+                                        <p:tgtEl>
+                                          <p:spTgt spid="3">
+                                            <p:txEl>
+                                              <p:pRg st="3" end="3"/>
+                                            </p:txEl>
+                                          </p:spTgt>
+                                        </p:tgtEl>
+                                        <p:attrNameLst>
+                                          <p:attrName>style.visibility</p:attrName>
+                                        </p:attrNameLst>
+                                      </p:cBhvr>
+                                      <p:to>
+                                        <p:strVal val="visible"/>
+                                      </p:to>
+                                    </p:set>
+                                  </p:childTnLst>
+                                </p:cTn>
+                              </p:par>
+                            </p:childTnLst>
+                          </p:cTn>
+                        </p:par>
+                      </p:childTnLst>
+                    </p:cTn>
+                  </p:par>
+                  <p:par>
+                    <p:cTn id="19" fill="hold">
+                      <p:stCondLst>
+                        <p:cond delay="indefinite"/>
+                      </p:stCondLst>
+                      <p:childTnLst>
+                        <p:par>
+                          <p:cTn id="20" fill="hold">
+                            <p:stCondLst>
+                              <p:cond delay="0"/>
+                            </p:stCondLst>
+                            <p:childTnLst>
+                              <p:par>
+                                <p:cTn id="21" presetID="1" presetClass="entr" presetSubtype="0" fill="hold" grpId="0" nodeType="clickEffect">
+                                  <p:stCondLst>
+                                    <p:cond delay="0"/>
+                                  </p:stCondLst>
+                                  <p:childTnLst>
+                                    <p:set>
+                                      <p:cBhvr>
+                                        <p:cTn id="22" dur="1" fill="hold">
+                                          <p:stCondLst>
+                                            <p:cond delay="0"/>
+                                          </p:stCondLst>
+                                        </p:cTn>
+                                        <p:tgtEl>
+                                          <p:spTgt spid="3">
+                                            <p:txEl>
+                                              <p:pRg st="4" end="4"/>
+                                            </p:txEl>
+                                          </p:spTgt>
+                                        </p:tgtEl>
+                                        <p:attrNameLst>
+                                          <p:attrName>style.visibility</p:attrName>
+                                        </p:attrNameLst>
+                                      </p:cBhvr>
+                                      <p:to>
+                                        <p:strVal val="visible"/>
+                                      </p:to>
+                                    </p:set>
+                                  </p:childTnLst>
+                                </p:cTn>
+                              </p:par>
+                            </p:childTnLst>
+                          </p:cTn>
+                        </p:par>
+                      </p:childTnLst>
+                    </p:cTn>
+                  </p:par>
+                </p:childTnLst>
+              </p:cTn>
+              <p:prevCondLst>
+                <p:cond evt="onPrev" delay="0">
+                  <p:tgtEl>
+                    <p:sldTgt/>
+                  </p:tgtEl>
+                </p:cond>
+              </p:prevCondLst>
+              <p:nextCondLst>
+                <p:cond evt="onNext" delay="0">
+                  <p:tgtEl>
+                    <p:sldTgt/>
+                  </p:tgtEl>
+                </p:cond>
+              </p:nextCondLst>
+            </p:seq>
+          </p:childTnLst>
+        </p:cTn>
+      </p:par>
+    </p:tnLst>
+    <p:bldLst>
+      <p:bldP spid="3" grpId="0" uiExpand="1" build="p"/>
+    </p:bldLst>
+  </p:timing>
+</p:sld>
+</file>
+
+<file path=ppt/slides/slide13.xml><?xml version="1.0" encoding="utf-8"?>
+<p:sld xmlns:a="http://schemas.openxmlformats.org/drawingml/2006/main" xmlns:r="http://schemas.openxmlformats.org/officeDocument/2006/relationships" xmlns:p="http://schemas.openxmlformats.org/presentationml/2006/main">
+  <p:cSld>
+    <p:spTree>
+      <p:nvGrpSpPr>
+        <p:cNvPr id="1" name=""/>
+        <p:cNvGrpSpPr/>
+        <p:nvPr/>
+      </p:nvGrpSpPr>
+      <p:grpSpPr>
+        <a:xfrm>
+          <a:off x="0" y="0"/>
+          <a:ext cx="0" cy="0"/>
+          <a:chOff x="0" y="0"/>
+          <a:chExt cx="0" cy="0"/>
+        </a:xfrm>
+      </p:grpSpPr>
+      <p:sp>
+        <p:nvSpPr>
+          <p:cNvPr id="4" name="Title 3">
+            <a:extLst>
+              <a:ext uri="{FF2B5EF4-FFF2-40B4-BE49-F238E27FC236}">
+                <a16:creationId xmlns:a16="http://schemas.microsoft.com/office/drawing/2014/main" id="{172241DE-921A-41CF-867A-03FA5D8B3C49}"/>
+              </a:ext>
+            </a:extLst>
+          </p:cNvPr>
+          <p:cNvSpPr>
+            <a:spLocks noGrp="1"/>
+          </p:cNvSpPr>
+          <p:nvPr>
+            <p:ph type="title"/>
+          </p:nvPr>
+        </p:nvSpPr>
+        <p:spPr/>
+        <p:txBody>
+          <a:bodyPr/>
+          <a:lstStyle/>
+          <a:p>
+            <a:r>
+              <a:rPr lang="en-US" dirty="0"/>
+              <a:t>GRUs</a:t>
+            </a:r>
+          </a:p>
+        </p:txBody>
+      </p:sp>
+      <p:sp>
+        <p:nvSpPr>
+          <p:cNvPr id="5" name="Text Placeholder 4">
+            <a:extLst>
+              <a:ext uri="{FF2B5EF4-FFF2-40B4-BE49-F238E27FC236}">
+                <a16:creationId xmlns:a16="http://schemas.microsoft.com/office/drawing/2014/main" id="{41B1213E-603F-4745-944F-17922B83FDC0}"/>
+              </a:ext>
+            </a:extLst>
+          </p:cNvPr>
+          <p:cNvSpPr>
+            <a:spLocks noGrp="1"/>
+          </p:cNvSpPr>
+          <p:nvPr>
+            <p:ph type="body" idx="1"/>
+          </p:nvPr>
+        </p:nvSpPr>
+        <p:spPr/>
+        <p:txBody>
+          <a:bodyPr/>
+          <a:lstStyle/>
+          <a:p>
+            <a:endParaRPr lang="en-US"/>
+          </a:p>
+        </p:txBody>
+      </p:sp>
+    </p:spTree>
+    <p:extLst>
+      <p:ext uri="{BB962C8B-B14F-4D97-AF65-F5344CB8AC3E}">
+        <p14:creationId xmlns:p14="http://schemas.microsoft.com/office/powerpoint/2010/main" val="3566453452"/>
+      </p:ext>
+    </p:extLst>
+  </p:cSld>
+  <p:clrMapOvr>
+    <a:masterClrMapping/>
+  </p:clrMapOvr>
+</p:sld>
+</file>
+
+<file path=ppt/slides/slide14.xml><?xml version="1.0" encoding="utf-8"?>
+<p:sld xmlns:a="http://schemas.openxmlformats.org/drawingml/2006/main" xmlns:r="http://schemas.openxmlformats.org/officeDocument/2006/relationships" xmlns:p="http://schemas.openxmlformats.org/presentationml/2006/main">
+  <p:cSld>
+    <p:spTree>
+      <p:nvGrpSpPr>
+        <p:cNvPr id="1" name=""/>
+        <p:cNvGrpSpPr/>
+        <p:nvPr/>
+      </p:nvGrpSpPr>
+      <p:grpSpPr>
+        <a:xfrm>
+          <a:off x="0" y="0"/>
+          <a:ext cx="0" cy="0"/>
+          <a:chOff x="0" y="0"/>
+          <a:chExt cx="0" cy="0"/>
+        </a:xfrm>
+      </p:grpSpPr>
+      <p:sp>
+        <p:nvSpPr>
+          <p:cNvPr id="3" name="Content Placeholder 2">
+            <a:extLst>
+              <a:ext uri="{FF2B5EF4-FFF2-40B4-BE49-F238E27FC236}">
+                <a16:creationId xmlns:a16="http://schemas.microsoft.com/office/drawing/2014/main" id="{7CC3A5DE-9A85-4210-AEE2-C44DC0B485DD}"/>
+              </a:ext>
+            </a:extLst>
+          </p:cNvPr>
+          <p:cNvSpPr>
+            <a:spLocks noGrp="1"/>
+          </p:cNvSpPr>
+          <p:nvPr>
+            <p:ph idx="1"/>
+          </p:nvPr>
+        </p:nvSpPr>
+        <p:spPr>
+          <a:xfrm>
+            <a:off x="8174368" y="1245794"/>
+            <a:ext cx="3799259" cy="3172784"/>
+          </a:xfrm>
+        </p:spPr>
+        <p:txBody>
+          <a:bodyPr>
+            <a:noAutofit/>
+          </a:bodyPr>
+          <a:lstStyle/>
+          <a:p>
+            <a:pPr marL="0" indent="0">
+              <a:buNone/>
+            </a:pPr>
+            <a:r>
+              <a:rPr lang="en-US" dirty="0"/>
+              <a:t>As your input sequence gets longer, RNNs have more trouble remembering what happened early on.</a:t>
+            </a:r>
+          </a:p>
+          <a:p>
+            <a:pPr marL="0" indent="0">
+              <a:buNone/>
+            </a:pPr>
+            <a:endParaRPr lang="en-US" sz="1800" dirty="0"/>
+          </a:p>
+          <a:p>
+            <a:pPr marL="0" indent="0">
+              <a:buNone/>
+            </a:pPr>
+            <a:r>
+              <a:rPr lang="en-US" dirty="0"/>
+              <a:t>LSTMs &amp; GRUs address this.</a:t>
+            </a:r>
+          </a:p>
+        </p:txBody>
+      </p:sp>
+      <p:pic>
+        <p:nvPicPr>
+          <p:cNvPr id="5" name="Picture 4">
+            <a:extLst>
+              <a:ext uri="{FF2B5EF4-FFF2-40B4-BE49-F238E27FC236}">
+                <a16:creationId xmlns:a16="http://schemas.microsoft.com/office/drawing/2014/main" id="{6BF38C7C-B3DF-499F-969D-A84F8085632A}"/>
+              </a:ext>
+            </a:extLst>
+          </p:cNvPr>
+          <p:cNvPicPr>
+            <a:picLocks noChangeAspect="1"/>
+          </p:cNvPicPr>
+          <p:nvPr/>
+        </p:nvPicPr>
+        <p:blipFill>
+          <a:blip r:embed="rId2"/>
+          <a:stretch>
+            <a:fillRect/>
+          </a:stretch>
+        </p:blipFill>
+        <p:spPr>
+          <a:xfrm>
+            <a:off x="371797" y="1043142"/>
+            <a:ext cx="7413926" cy="4880421"/>
+          </a:xfrm>
+          <a:prstGeom prst="rect">
+            <a:avLst/>
+          </a:prstGeom>
+          <a:ln>
+            <a:noFill/>
+          </a:ln>
+          <a:effectLst>
+            <a:outerShdw blurRad="292100" dist="139700" dir="2700000" algn="tl" rotWithShape="0">
+              <a:srgbClr val="333333">
+                <a:alpha val="65000"/>
+              </a:srgbClr>
+            </a:outerShdw>
+          </a:effectLst>
+        </p:spPr>
+      </p:pic>
+      <p:sp>
+        <p:nvSpPr>
+          <p:cNvPr id="2" name="Title 1">
+            <a:extLst>
+              <a:ext uri="{FF2B5EF4-FFF2-40B4-BE49-F238E27FC236}">
+                <a16:creationId xmlns:a16="http://schemas.microsoft.com/office/drawing/2014/main" id="{D8722175-F823-43DC-B301-AA68B94B6E52}"/>
+              </a:ext>
+            </a:extLst>
+          </p:cNvPr>
+          <p:cNvSpPr>
+            <a:spLocks noGrp="1"/>
+          </p:cNvSpPr>
+          <p:nvPr>
+            <p:ph type="title"/>
+          </p:nvPr>
+        </p:nvSpPr>
+        <p:spPr>
+          <a:xfrm>
+            <a:off x="420890" y="58280"/>
+            <a:ext cx="10831148" cy="1120008"/>
+          </a:xfrm>
+        </p:spPr>
+        <p:txBody>
+          <a:bodyPr>
+            <a:normAutofit fontScale="90000"/>
+          </a:bodyPr>
+          <a:lstStyle/>
+          <a:p>
+            <a:r>
+              <a:rPr lang="en-US" dirty="0"/>
+              <a:t>The problem: RNNs suffer from short-term memory</a:t>
+            </a:r>
+          </a:p>
+        </p:txBody>
+      </p:sp>
+      <p:pic>
+        <p:nvPicPr>
+          <p:cNvPr id="4" name="Picture 3">
+            <a:extLst>
+              <a:ext uri="{FF2B5EF4-FFF2-40B4-BE49-F238E27FC236}">
+                <a16:creationId xmlns:a16="http://schemas.microsoft.com/office/drawing/2014/main" id="{39271C60-5B37-4429-A08A-B07E537721AD}"/>
+              </a:ext>
+            </a:extLst>
+          </p:cNvPr>
+          <p:cNvPicPr>
+            <a:picLocks noChangeAspect="1"/>
+          </p:cNvPicPr>
+          <p:nvPr/>
+        </p:nvPicPr>
+        <p:blipFill>
+          <a:blip r:embed="rId3"/>
+          <a:stretch>
+            <a:fillRect/>
+          </a:stretch>
+        </p:blipFill>
+        <p:spPr>
+          <a:xfrm>
+            <a:off x="7430269" y="4636296"/>
+            <a:ext cx="4445168" cy="1426648"/>
+          </a:xfrm>
+          <a:prstGeom prst="rect">
+            <a:avLst/>
+          </a:prstGeom>
+          <a:ln>
+            <a:noFill/>
+          </a:ln>
+          <a:effectLst>
+            <a:outerShdw blurRad="292100" dist="139700" dir="2700000" algn="tl" rotWithShape="0">
+              <a:srgbClr val="333333">
+                <a:alpha val="65000"/>
+              </a:srgbClr>
+            </a:outerShdw>
+          </a:effectLst>
+        </p:spPr>
+      </p:pic>
+      <p:sp>
+        <p:nvSpPr>
+          <p:cNvPr id="6" name="Rectangle 5">
+            <a:extLst>
+              <a:ext uri="{FF2B5EF4-FFF2-40B4-BE49-F238E27FC236}">
+                <a16:creationId xmlns:a16="http://schemas.microsoft.com/office/drawing/2014/main" id="{7E4890E6-8BF4-44F3-AAFA-0EF11CF5F70A}"/>
+              </a:ext>
+            </a:extLst>
+          </p:cNvPr>
+          <p:cNvSpPr/>
+          <p:nvPr/>
+        </p:nvSpPr>
+        <p:spPr>
+          <a:xfrm>
+            <a:off x="488398" y="6280662"/>
+            <a:ext cx="10882210" cy="461665"/>
+          </a:xfrm>
+          <a:prstGeom prst="rect">
+            <a:avLst/>
+          </a:prstGeom>
+        </p:spPr>
+        <p:txBody>
+          <a:bodyPr wrap="none">
+            <a:spAutoFit/>
+          </a:bodyPr>
+          <a:lstStyle/>
+          <a:p>
+            <a:r>
+              <a:rPr lang="en-US" sz="2400" dirty="0">
+                <a:solidFill>
+                  <a:srgbClr val="333333"/>
+                </a:solidFill>
+                <a:latin typeface="CMS"/>
+              </a:rPr>
+              <a:t>“I grew up in France, and moved to the USA when I was 25.  I still speak fluent </a:t>
+            </a:r>
+            <a:r>
+              <a:rPr lang="en-US" sz="2400" i="1" dirty="0">
+                <a:solidFill>
+                  <a:srgbClr val="333333"/>
+                </a:solidFill>
+                <a:latin typeface="CMS"/>
+              </a:rPr>
+              <a:t>_____</a:t>
+            </a:r>
+            <a:r>
+              <a:rPr lang="en-US" sz="2400" dirty="0">
+                <a:solidFill>
+                  <a:srgbClr val="333333"/>
+                </a:solidFill>
+                <a:latin typeface="CMS"/>
+              </a:rPr>
+              <a:t>.”</a:t>
+            </a:r>
+            <a:endParaRPr lang="en-US" sz="2400" dirty="0"/>
+          </a:p>
+        </p:txBody>
+      </p:sp>
+    </p:spTree>
+    <p:extLst>
+      <p:ext uri="{BB962C8B-B14F-4D97-AF65-F5344CB8AC3E}">
+        <p14:creationId xmlns:p14="http://schemas.microsoft.com/office/powerpoint/2010/main" val="916589466"/>
+      </p:ext>
+    </p:extLst>
+  </p:cSld>
+  <p:clrMapOvr>
+    <a:masterClrMapping/>
+  </p:clrMapOvr>
+</p:sld>
+</file>
+
+<file path=ppt/slides/slide15.xml><?xml version="1.0" encoding="utf-8"?>
+<p:sld xmlns:a="http://schemas.openxmlformats.org/drawingml/2006/main" xmlns:r="http://schemas.openxmlformats.org/officeDocument/2006/relationships" xmlns:p="http://schemas.openxmlformats.org/presentationml/2006/main">
+  <p:cSld>
+    <p:spTree>
+      <p:nvGrpSpPr>
+        <p:cNvPr id="1" name=""/>
+        <p:cNvGrpSpPr/>
+        <p:nvPr/>
+      </p:nvGrpSpPr>
+      <p:grpSpPr>
+        <a:xfrm>
+          <a:off x="0" y="0"/>
+          <a:ext cx="0" cy="0"/>
+          <a:chOff x="0" y="0"/>
+          <a:chExt cx="0" cy="0"/>
+        </a:xfrm>
+      </p:grpSpPr>
+      <p:pic>
+        <p:nvPicPr>
+          <p:cNvPr id="1026" name="Picture 2" descr="https://cdn-images-1.medium.com/max/2200/1*WMnFSJHzOloFlJHU6fVN-g.gif">
+            <a:extLst>
+              <a:ext uri="{FF2B5EF4-FFF2-40B4-BE49-F238E27FC236}">
+                <a16:creationId xmlns:a16="http://schemas.microsoft.com/office/drawing/2014/main" id="{2355C12F-DF46-4C88-B8C5-2AC390AE5DDB}"/>
+              </a:ext>
+            </a:extLst>
+          </p:cNvPr>
+          <p:cNvPicPr>
+            <a:picLocks noChangeAspect="1" noChangeArrowheads="1" noCrop="1"/>
+          </p:cNvPicPr>
+          <p:nvPr/>
+        </p:nvPicPr>
+        <p:blipFill>
+          <a:blip r:embed="rId2">
+            <a:extLst>
+              <a:ext uri="{28A0092B-C50C-407E-A947-70E740481C1C}">
+                <a14:useLocalDpi xmlns:a14="http://schemas.microsoft.com/office/drawing/2010/main" val="0"/>
+              </a:ext>
+            </a:extLst>
+          </a:blip>
+          <a:srcRect/>
+          <a:stretch>
+            <a:fillRect/>
+          </a:stretch>
+        </p:blipFill>
+        <p:spPr bwMode="auto">
+          <a:xfrm>
+            <a:off x="-1200014" y="773252"/>
+            <a:ext cx="12102687" cy="4790116"/>
+          </a:xfrm>
+          <a:prstGeom prst="rect">
+            <a:avLst/>
+          </a:prstGeom>
+          <a:noFill/>
+          <a:extLst>
+            <a:ext uri="{909E8E84-426E-40DD-AFC4-6F175D3DCCD1}">
+              <a14:hiddenFill xmlns:a14="http://schemas.microsoft.com/office/drawing/2010/main">
+                <a:solidFill>
+                  <a:srgbClr val="FFFFFF"/>
+                </a:solidFill>
+              </a14:hiddenFill>
+            </a:ext>
+          </a:extLst>
+        </p:spPr>
+      </p:pic>
+      <p:sp>
+        <p:nvSpPr>
+          <p:cNvPr id="3" name="Title 1">
+            <a:extLst>
+              <a:ext uri="{FF2B5EF4-FFF2-40B4-BE49-F238E27FC236}">
+                <a16:creationId xmlns:a16="http://schemas.microsoft.com/office/drawing/2014/main" id="{D8BFAE23-8741-4D0E-AE2C-7CC5DAE3B185}"/>
+              </a:ext>
+            </a:extLst>
+          </p:cNvPr>
+          <p:cNvSpPr txBox="1">
+            <a:spLocks/>
+          </p:cNvSpPr>
+          <p:nvPr/>
+        </p:nvSpPr>
+        <p:spPr>
+          <a:xfrm>
+            <a:off x="549765" y="567644"/>
+            <a:ext cx="10831148" cy="1120008"/>
+          </a:xfrm>
+          <a:prstGeom prst="rect">
+            <a:avLst/>
+          </a:prstGeom>
+        </p:spPr>
+        <p:txBody>
+          <a:bodyPr>
+            <a:normAutofit fontScale="97500"/>
+          </a:bodyPr>
+          <a:lstStyle>
+            <a:lvl1pPr algn="l" defTabSz="914400" rtl="0" eaLnBrk="1" latinLnBrk="0" hangingPunct="1">
+              <a:lnSpc>
+                <a:spcPct val="90000"/>
+              </a:lnSpc>
+              <a:spcBef>
+                <a:spcPct val="0"/>
+              </a:spcBef>
+              <a:buNone/>
+              <a:defRPr sz="4400" kern="1200">
+                <a:solidFill>
+                  <a:schemeClr val="tx1"/>
+                </a:solidFill>
+                <a:latin typeface="+mj-lt"/>
+                <a:ea typeface="+mj-ea"/>
+                <a:cs typeface="+mj-cs"/>
+              </a:defRPr>
+            </a:lvl1pPr>
+          </a:lstStyle>
+          <a:p>
+            <a:r>
+              <a:rPr lang="en-US" dirty="0"/>
+              <a:t>A simple RNN</a:t>
+            </a:r>
+          </a:p>
+        </p:txBody>
+      </p:sp>
+      <p:pic>
+        <p:nvPicPr>
+          <p:cNvPr id="4" name="Picture 3">
+            <a:extLst>
+              <a:ext uri="{FF2B5EF4-FFF2-40B4-BE49-F238E27FC236}">
+                <a16:creationId xmlns:a16="http://schemas.microsoft.com/office/drawing/2014/main" id="{F0AAB525-1099-4EA0-B421-43A30B5370F8}"/>
+              </a:ext>
+            </a:extLst>
+          </p:cNvPr>
+          <p:cNvPicPr>
+            <a:picLocks noChangeAspect="1"/>
+          </p:cNvPicPr>
+          <p:nvPr/>
+        </p:nvPicPr>
+        <p:blipFill>
+          <a:blip r:embed="rId3"/>
+          <a:stretch>
+            <a:fillRect/>
+          </a:stretch>
+        </p:blipFill>
+        <p:spPr>
+          <a:xfrm>
+            <a:off x="6782720" y="4970899"/>
+            <a:ext cx="5190907" cy="1665988"/>
+          </a:xfrm>
+          <a:prstGeom prst="rect">
+            <a:avLst/>
+          </a:prstGeom>
+          <a:ln>
+            <a:noFill/>
+          </a:ln>
+          <a:effectLst>
+            <a:outerShdw blurRad="292100" dist="139700" dir="2700000" algn="tl" rotWithShape="0">
+              <a:srgbClr val="333333">
+                <a:alpha val="65000"/>
+              </a:srgbClr>
+            </a:outerShdw>
+          </a:effectLst>
+        </p:spPr>
+      </p:pic>
+    </p:spTree>
+    <p:extLst>
+      <p:ext uri="{BB962C8B-B14F-4D97-AF65-F5344CB8AC3E}">
+        <p14:creationId xmlns:p14="http://schemas.microsoft.com/office/powerpoint/2010/main" val="1511663113"/>
+      </p:ext>
+    </p:extLst>
+  </p:cSld>
+  <p:clrMapOvr>
+    <a:masterClrMapping/>
+  </p:clrMapOvr>
+</p:sld>
+</file>
+
+<file path=ppt/slides/slide16.xml><?xml version="1.0" encoding="utf-8"?>
+<p:sld xmlns:a="http://schemas.openxmlformats.org/drawingml/2006/main" xmlns:r="http://schemas.openxmlformats.org/officeDocument/2006/relationships" xmlns:p="http://schemas.openxmlformats.org/presentationml/2006/main">
+  <p:cSld>
+    <p:spTree>
+      <p:nvGrpSpPr>
+        <p:cNvPr id="1" name=""/>
+        <p:cNvGrpSpPr/>
+        <p:nvPr/>
+      </p:nvGrpSpPr>
+      <p:grpSpPr>
+        <a:xfrm>
+          <a:off x="0" y="0"/>
+          <a:ext cx="0" cy="0"/>
+          <a:chOff x="0" y="0"/>
+          <a:chExt cx="0" cy="0"/>
+        </a:xfrm>
+      </p:grpSpPr>
+      <p:pic>
+        <p:nvPicPr>
+          <p:cNvPr id="4" name="Picture 3">
+            <a:extLst>
+              <a:ext uri="{FF2B5EF4-FFF2-40B4-BE49-F238E27FC236}">
+                <a16:creationId xmlns:a16="http://schemas.microsoft.com/office/drawing/2014/main" id="{39271C60-5B37-4429-A08A-B07E537721AD}"/>
+              </a:ext>
+            </a:extLst>
+          </p:cNvPr>
+          <p:cNvPicPr>
+            <a:picLocks noChangeAspect="1"/>
+          </p:cNvPicPr>
+          <p:nvPr/>
+        </p:nvPicPr>
+        <p:blipFill>
+          <a:blip r:embed="rId2"/>
+          <a:stretch>
+            <a:fillRect/>
+          </a:stretch>
+        </p:blipFill>
+        <p:spPr>
+          <a:xfrm>
+            <a:off x="6648871" y="4927941"/>
+            <a:ext cx="5324756" cy="1708946"/>
+          </a:xfrm>
+          <a:prstGeom prst="rect">
+            <a:avLst/>
+          </a:prstGeom>
+          <a:ln>
+            <a:noFill/>
+          </a:ln>
+          <a:effectLst>
+            <a:outerShdw blurRad="292100" dist="139700" dir="2700000" algn="tl" rotWithShape="0">
+              <a:srgbClr val="333333">
+                <a:alpha val="65000"/>
+              </a:srgbClr>
+            </a:outerShdw>
+          </a:effectLst>
+        </p:spPr>
+      </p:pic>
+      <p:sp>
+        <p:nvSpPr>
+          <p:cNvPr id="7" name="Content Placeholder 6">
+            <a:extLst>
+              <a:ext uri="{FF2B5EF4-FFF2-40B4-BE49-F238E27FC236}">
+                <a16:creationId xmlns:a16="http://schemas.microsoft.com/office/drawing/2014/main" id="{76296308-D29C-47AD-9E05-0E5CAE83421E}"/>
+              </a:ext>
+            </a:extLst>
+          </p:cNvPr>
+          <p:cNvSpPr>
+            <a:spLocks noGrp="1"/>
+          </p:cNvSpPr>
+          <p:nvPr>
+            <p:ph idx="1"/>
+          </p:nvPr>
+        </p:nvSpPr>
+        <p:spPr>
+          <a:xfrm>
+            <a:off x="7401117" y="2865938"/>
+            <a:ext cx="3952683" cy="1024866"/>
+          </a:xfrm>
+        </p:spPr>
+        <p:txBody>
+          <a:bodyPr/>
+          <a:lstStyle/>
+          <a:p>
+            <a:pPr marL="0" indent="0">
+              <a:buNone/>
+            </a:pPr>
+            <a:r>
+              <a:rPr lang="en-US" dirty="0"/>
+              <a:t>Sigmoid is between 0-1: </a:t>
+            </a:r>
+          </a:p>
+          <a:p>
+            <a:pPr marL="0" indent="0">
+              <a:buNone/>
+            </a:pPr>
+            <a:r>
+              <a:rPr lang="en-US" dirty="0"/>
+              <a:t>0 indicates forgetting</a:t>
+            </a:r>
+          </a:p>
+        </p:txBody>
+      </p:sp>
+      <p:pic>
+        <p:nvPicPr>
+          <p:cNvPr id="12" name="Picture 11">
+            <a:extLst>
+              <a:ext uri="{FF2B5EF4-FFF2-40B4-BE49-F238E27FC236}">
+                <a16:creationId xmlns:a16="http://schemas.microsoft.com/office/drawing/2014/main" id="{244FC6C3-8B36-4E41-B892-39BB6DB0C81B}"/>
+              </a:ext>
+            </a:extLst>
+          </p:cNvPr>
+          <p:cNvPicPr>
+            <a:picLocks noChangeAspect="1"/>
+          </p:cNvPicPr>
+          <p:nvPr/>
+        </p:nvPicPr>
+        <p:blipFill rotWithShape="1">
+          <a:blip r:embed="rId3"/>
+          <a:srcRect l="55746" b="32063"/>
+          <a:stretch/>
+        </p:blipFill>
+        <p:spPr>
+          <a:xfrm>
+            <a:off x="263886" y="173993"/>
+            <a:ext cx="5934396" cy="5996998"/>
+          </a:xfrm>
+          <a:prstGeom prst="rect">
+            <a:avLst/>
+          </a:prstGeom>
+          <a:ln>
+            <a:noFill/>
+          </a:ln>
+          <a:effectLst>
+            <a:outerShdw blurRad="292100" dist="139700" dir="2700000" algn="tl" rotWithShape="0">
+              <a:srgbClr val="333333">
+                <a:alpha val="65000"/>
+              </a:srgbClr>
+            </a:outerShdw>
+          </a:effectLst>
+        </p:spPr>
+      </p:pic>
+      <p:pic>
+        <p:nvPicPr>
+          <p:cNvPr id="5" name="Picture 4">
+            <a:extLst>
+              <a:ext uri="{FF2B5EF4-FFF2-40B4-BE49-F238E27FC236}">
+                <a16:creationId xmlns:a16="http://schemas.microsoft.com/office/drawing/2014/main" id="{6BF38C7C-B3DF-499F-969D-A84F8085632A}"/>
+              </a:ext>
+            </a:extLst>
+          </p:cNvPr>
+          <p:cNvPicPr>
+            <a:picLocks noChangeAspect="1"/>
+          </p:cNvPicPr>
+          <p:nvPr/>
+        </p:nvPicPr>
+        <p:blipFill rotWithShape="1">
+          <a:blip r:embed="rId3"/>
+          <a:srcRect l="3907" t="70563" r="6880" b="1270"/>
+          <a:stretch/>
+        </p:blipFill>
+        <p:spPr>
+          <a:xfrm>
+            <a:off x="4723378" y="380673"/>
+            <a:ext cx="7204736" cy="1497407"/>
+          </a:xfrm>
+          <a:prstGeom prst="rect">
+            <a:avLst/>
+          </a:prstGeom>
+          <a:ln>
+            <a:noFill/>
+          </a:ln>
+          <a:effectLst>
+            <a:outerShdw blurRad="292100" dist="139700" dir="2700000" algn="tl" rotWithShape="0">
+              <a:srgbClr val="333333">
+                <a:alpha val="65000"/>
+              </a:srgbClr>
+            </a:outerShdw>
+          </a:effectLst>
+        </p:spPr>
+      </p:pic>
+    </p:spTree>
+    <p:extLst>
+      <p:ext uri="{BB962C8B-B14F-4D97-AF65-F5344CB8AC3E}">
+        <p14:creationId xmlns:p14="http://schemas.microsoft.com/office/powerpoint/2010/main" val="1558884291"/>
+      </p:ext>
+    </p:extLst>
+  </p:cSld>
+  <p:clrMapOvr>
+    <a:masterClrMapping/>
+  </p:clrMapOvr>
+</p:sld>
+</file>
+
+<file path=ppt/slides/slide17.xml><?xml version="1.0" encoding="utf-8"?>
+<p:sld xmlns:a="http://schemas.openxmlformats.org/drawingml/2006/main" xmlns:r="http://schemas.openxmlformats.org/officeDocument/2006/relationships" xmlns:p="http://schemas.openxmlformats.org/presentationml/2006/main">
+  <p:cSld>
+    <p:spTree>
+      <p:nvGrpSpPr>
+        <p:cNvPr id="1" name=""/>
+        <p:cNvGrpSpPr/>
+        <p:nvPr/>
+      </p:nvGrpSpPr>
+      <p:grpSpPr>
+        <a:xfrm>
+          <a:off x="0" y="0"/>
+          <a:ext cx="0" cy="0"/>
+          <a:chOff x="0" y="0"/>
+          <a:chExt cx="0" cy="0"/>
+        </a:xfrm>
+      </p:grpSpPr>
+      <p:sp>
+        <p:nvSpPr>
+          <p:cNvPr id="2" name="Title 1">
+            <a:extLst>
+              <a:ext uri="{FF2B5EF4-FFF2-40B4-BE49-F238E27FC236}">
+                <a16:creationId xmlns:a16="http://schemas.microsoft.com/office/drawing/2014/main" id="{0BC7BF8D-3FE9-43CC-9C34-7EE1BBB93F3F}"/>
+              </a:ext>
+            </a:extLst>
+          </p:cNvPr>
+          <p:cNvSpPr>
+            <a:spLocks noGrp="1"/>
+          </p:cNvSpPr>
+          <p:nvPr>
+            <p:ph type="title"/>
+          </p:nvPr>
+        </p:nvSpPr>
+        <p:spPr/>
+        <p:txBody>
+          <a:bodyPr/>
+          <a:lstStyle/>
+          <a:p>
+            <a:r>
+              <a:rPr lang="en-US" dirty="0"/>
+              <a:t>GRU in equations</a:t>
+            </a:r>
+          </a:p>
+        </p:txBody>
+      </p:sp>
+      <mc:AlternateContent xmlns:mc="http://schemas.openxmlformats.org/markup-compatibility/2006" xmlns:a14="http://schemas.microsoft.com/office/drawing/2010/main">
+        <mc:Choice Requires="a14">
+          <p:sp>
+            <p:nvSpPr>
+              <p:cNvPr id="4" name="AutoShape 2" descr="{\displaystyle {\begin{aligned}z_{t}&amp;=\sigma _{g}(W_{z}x_{t}+U_{z}h_{t-1}+b_{z})\\r_{t}&amp;=\sigma _{g}(W_{r}x_{t}+U_{r}h_{t-1}+b_{r})\\h_{t}&amp;=(1-z_{t})\circ h_{t-1}+z_{t}\circ \sigma _{h}(W_{h}x_{t}+U_{h}(r_{t}\circ h_{t-1})+b_{h})\end{aligned}}}">
+                <a:extLst>
+                  <a:ext uri="{FF2B5EF4-FFF2-40B4-BE49-F238E27FC236}">
+                    <a16:creationId xmlns:a16="http://schemas.microsoft.com/office/drawing/2014/main" id="{E8EFC93E-C427-4320-9750-D0E0F492021C}"/>
+                  </a:ext>
+                </a:extLst>
+              </p:cNvPr>
+              <p:cNvSpPr>
+                <a:spLocks noGrp="1" noChangeAspect="1" noChangeArrowheads="1"/>
+              </p:cNvSpPr>
+              <p:nvPr>
+                <p:ph idx="1"/>
+              </p:nvPr>
+            </p:nvSpPr>
+            <p:spPr bwMode="auto">
+              <a:prstGeom prst="rect">
+                <a:avLst/>
+              </a:prstGeom>
+              <a:noFill/>
+              <a:extLst>
+                <a:ext uri="{909E8E84-426E-40DD-AFC4-6F175D3DCCD1}">
+                  <a14:hiddenFill>
+                    <a:solidFill>
+                      <a:srgbClr val="FFFFFF"/>
+                    </a:solidFill>
+                  </a14:hiddenFill>
+                </a:ext>
+              </a:extLst>
+            </p:spPr>
+            <p:txBody>
+              <a:bodyPr vert="horz" wrap="square" lIns="91440" tIns="45720" rIns="91440" bIns="45720" numCol="1" anchor="t" anchorCtr="0" compatLnSpc="1">
+                <a:prstTxWarp prst="textNoShape">
+                  <a:avLst/>
+                </a:prstTxWarp>
+                <a:normAutofit/>
+              </a:bodyPr>
+              <a:lstStyle/>
+              <a:p>
+                <a:pPr marL="0" indent="0">
+                  <a:buNone/>
+                </a:pPr>
+                <a:r>
+                  <a:rPr lang="en-US" sz="2400" dirty="0"/>
+                  <a:t>hidden state: 	</a:t>
+                </a:r>
+                <a:r>
+                  <a:rPr lang="en-US" sz="2400" dirty="0" err="1"/>
+                  <a:t>h</a:t>
+                </a:r>
+                <a:r>
+                  <a:rPr lang="en-US" sz="2400" baseline="-25000" dirty="0" err="1"/>
+                  <a:t>t</a:t>
+                </a:r>
+                <a:r>
+                  <a:rPr lang="en-US" sz="2400" baseline="-25000" dirty="0"/>
+                  <a:t> </a:t>
+                </a:r>
+              </a:p>
+              <a:p>
+                <a:pPr marL="0" indent="0">
+                  <a:buNone/>
+                </a:pPr>
+                <a:r>
+                  <a:rPr lang="en-US" sz="2400" dirty="0"/>
+                  <a:t>input: 		</a:t>
+                </a:r>
+                <a:r>
+                  <a:rPr lang="en-US" sz="2400" dirty="0" err="1"/>
+                  <a:t>x</a:t>
+                </a:r>
+                <a:r>
+                  <a:rPr lang="en-US" sz="2400" baseline="-25000" dirty="0" err="1"/>
+                  <a:t>t</a:t>
+                </a:r>
+                <a:endParaRPr lang="en-US" sz="2400" dirty="0"/>
+              </a:p>
+              <a:p>
+                <a:pPr marL="0" indent="0">
+                  <a:buNone/>
+                </a:pPr>
+                <a:endParaRPr lang="en-US" dirty="0"/>
+              </a:p>
+              <a:p>
+                <a:pPr marL="0" indent="0">
+                  <a:buNone/>
+                </a:pPr>
+                <a:r>
+                  <a:rPr lang="en-US" sz="2400" dirty="0"/>
+                  <a:t>update gate:	</a:t>
+                </a:r>
+                <a:r>
+                  <a:rPr lang="en-US" sz="2400" dirty="0" err="1"/>
+                  <a:t>z</a:t>
+                </a:r>
+                <a:r>
+                  <a:rPr lang="en-US" sz="2400" baseline="-25000" dirty="0" err="1"/>
+                  <a:t>t</a:t>
+                </a:r>
+                <a:r>
+                  <a:rPr lang="en-US" sz="2400" dirty="0"/>
+                  <a:t> = sig(A </a:t>
+                </a:r>
+                <a:r>
+                  <a:rPr lang="en-US" sz="2400" dirty="0" err="1"/>
+                  <a:t>x</a:t>
+                </a:r>
+                <a:r>
+                  <a:rPr lang="en-US" sz="2400" baseline="-25000" dirty="0" err="1"/>
+                  <a:t>t</a:t>
+                </a:r>
+                <a:r>
+                  <a:rPr lang="en-US" sz="2400" dirty="0"/>
+                  <a:t> + B h</a:t>
+                </a:r>
+                <a:r>
+                  <a:rPr lang="en-US" sz="2400" baseline="-25000" dirty="0"/>
+                  <a:t>t-1</a:t>
+                </a:r>
+                <a:r>
+                  <a:rPr lang="en-US" sz="2400" dirty="0"/>
+                  <a:t>)</a:t>
+                </a:r>
+              </a:p>
+              <a:p>
+                <a:pPr marL="0" indent="0">
+                  <a:buNone/>
+                </a:pPr>
+                <a:r>
+                  <a:rPr lang="en-US" sz="2400" dirty="0"/>
+                  <a:t>reset gate:	r</a:t>
+                </a:r>
+                <a:r>
+                  <a:rPr lang="en-US" sz="2400" baseline="-25000" dirty="0"/>
+                  <a:t>t</a:t>
+                </a:r>
+                <a:r>
+                  <a:rPr lang="en-US" sz="2400" dirty="0"/>
+                  <a:t> = sig(C </a:t>
+                </a:r>
+                <a:r>
+                  <a:rPr lang="en-US" sz="2400" dirty="0" err="1"/>
+                  <a:t>x</a:t>
+                </a:r>
+                <a:r>
+                  <a:rPr lang="en-US" sz="2400" baseline="-25000" dirty="0" err="1"/>
+                  <a:t>t</a:t>
+                </a:r>
+                <a:r>
+                  <a:rPr lang="en-US" sz="2400" dirty="0"/>
+                  <a:t> + D h</a:t>
+                </a:r>
+                <a:r>
+                  <a:rPr lang="en-US" sz="2400" baseline="-25000" dirty="0"/>
+                  <a:t>t-1</a:t>
+                </a:r>
+                <a:r>
+                  <a:rPr lang="en-US" sz="2400" dirty="0"/>
+                  <a:t>)</a:t>
+                </a:r>
+              </a:p>
+              <a:p>
+                <a:pPr marL="0" indent="0">
+                  <a:buNone/>
+                </a:pPr>
+                <a:r>
+                  <a:rPr lang="en-US" sz="2400" dirty="0"/>
+                  <a:t>new gate:	</a:t>
+                </a:r>
+                <a:r>
+                  <a:rPr lang="en-US" sz="2400" dirty="0" err="1"/>
+                  <a:t>n</a:t>
+                </a:r>
+                <a:r>
+                  <a:rPr lang="en-US" sz="2400" baseline="-25000" dirty="0" err="1"/>
+                  <a:t>t</a:t>
+                </a:r>
+                <a:r>
+                  <a:rPr lang="en-US" sz="2400" dirty="0"/>
+                  <a:t> = tanh(G </a:t>
+                </a:r>
+                <a:r>
+                  <a:rPr lang="en-US" sz="2400" dirty="0" err="1"/>
+                  <a:t>x</a:t>
+                </a:r>
+                <a:r>
+                  <a:rPr lang="en-US" sz="2400" baseline="-25000" dirty="0" err="1"/>
+                  <a:t>t</a:t>
+                </a:r>
+                <a:r>
+                  <a:rPr lang="en-US" sz="2400" dirty="0"/>
+                  <a:t> + H r</a:t>
+                </a:r>
+                <a:r>
+                  <a:rPr lang="en-US" sz="2400" baseline="-25000" dirty="0"/>
+                  <a:t>t</a:t>
+                </a:r>
+                <a:r>
+                  <a:rPr lang="en-US" sz="2400" dirty="0"/>
+                  <a:t> </a:t>
+                </a:r>
+                <a14:m>
+                  <m:oMath xmlns:m="http://schemas.openxmlformats.org/officeDocument/2006/math">
+                    <m:r>
+                      <a:rPr lang="en-US" sz="2000" i="1" dirty="0">
+                        <a:latin typeface="Cambria Math" panose="02040503050406030204" pitchFamily="18" charset="0"/>
+                      </a:rPr>
+                      <m:t>⊗ </m:t>
+                    </m:r>
+                  </m:oMath>
+                </a14:m>
+                <a:r>
+                  <a:rPr lang="en-US" sz="2400" dirty="0"/>
+                  <a:t>h</a:t>
+                </a:r>
+                <a:r>
+                  <a:rPr lang="en-US" sz="2400" baseline="-25000" dirty="0"/>
+                  <a:t>t-1</a:t>
+                </a:r>
+                <a:r>
+                  <a:rPr lang="en-US" sz="2400" dirty="0"/>
+                  <a:t>)</a:t>
+                </a:r>
+              </a:p>
+              <a:p>
+                <a:pPr marL="0" indent="0">
+                  <a:buNone/>
+                </a:pPr>
+                <a:r>
+                  <a:rPr lang="en-US" sz="2400" dirty="0"/>
+                  <a:t>hidden state:	</a:t>
+                </a:r>
+                <a:r>
+                  <a:rPr lang="en-US" sz="2400" dirty="0" err="1"/>
+                  <a:t>h</a:t>
+                </a:r>
+                <a:r>
+                  <a:rPr lang="en-US" sz="2400" baseline="-25000" dirty="0" err="1"/>
+                  <a:t>t</a:t>
+                </a:r>
+                <a:r>
+                  <a:rPr lang="en-US" sz="2400" dirty="0"/>
+                  <a:t> = z</a:t>
+                </a:r>
+                <a:r>
+                  <a:rPr lang="en-US" sz="2400" baseline="-25000" dirty="0" err="1"/>
+                  <a:t>t</a:t>
+                </a:r>
+                <a:r>
+                  <a:rPr lang="en-US" sz="2400" dirty="0"/>
+                  <a:t> </a:t>
+                </a:r>
+                <a14:m>
+                  <m:oMath xmlns:m="http://schemas.openxmlformats.org/officeDocument/2006/math">
+                    <m:r>
+                      <a:rPr lang="en-US" sz="2000" i="1" dirty="0">
+                        <a:latin typeface="Cambria Math" panose="02040503050406030204" pitchFamily="18" charset="0"/>
+                      </a:rPr>
+                      <m:t>⊗ </m:t>
+                    </m:r>
+                  </m:oMath>
+                </a14:m>
+                <a:r>
+                  <a:rPr lang="en-US" sz="2400" dirty="0"/>
+                  <a:t>n</a:t>
+                </a:r>
+                <a:r>
+                  <a:rPr lang="en-US" sz="2400" baseline="-25000" dirty="0"/>
+                  <a:t>t</a:t>
+                </a:r>
+                <a:r>
+                  <a:rPr lang="en-US" sz="2400" dirty="0"/>
+                  <a:t> + (1 – </a:t>
+                </a:r>
+                <a:r>
+                  <a:rPr lang="en-US" sz="2400" dirty="0" err="1"/>
+                  <a:t>z</a:t>
+                </a:r>
+                <a:r>
+                  <a:rPr lang="en-US" sz="2400" baseline="-25000" dirty="0" err="1"/>
+                  <a:t>t</a:t>
+                </a:r>
+                <a:r>
+                  <a:rPr lang="en-US" sz="2400" dirty="0"/>
+                  <a:t>) </a:t>
+                </a:r>
+                <a14:m>
+                  <m:oMath xmlns:m="http://schemas.openxmlformats.org/officeDocument/2006/math">
+                    <m:r>
+                      <a:rPr lang="en-US" sz="2000" i="1" dirty="0">
+                        <a:latin typeface="Cambria Math" panose="02040503050406030204" pitchFamily="18" charset="0"/>
+                      </a:rPr>
+                      <m:t>⊗</m:t>
+                    </m:r>
+                  </m:oMath>
+                </a14:m>
+                <a:r>
+                  <a:rPr lang="en-US" sz="2400" dirty="0"/>
+                  <a:t> h</a:t>
+                </a:r>
+                <a:r>
+                  <a:rPr lang="en-US" sz="2400" baseline="-25000" dirty="0"/>
+                  <a:t>t-1</a:t>
+                </a:r>
+                <a:endParaRPr lang="en-US" sz="2400" dirty="0"/>
+              </a:p>
+            </p:txBody>
+          </p:sp>
+        </mc:Choice>
+        <mc:Fallback xmlns="">
+          <p:sp>
+            <p:nvSpPr>
+              <p:cNvPr id="4" name="AutoShape 2" descr="{\displaystyle {\begin{aligned}z_{t}&amp;=\sigma _{g}(W_{z}x_{t}+U_{z}h_{t-1}+b_{z})\\r_{t}&amp;=\sigma _{g}(W_{r}x_{t}+U_{r}h_{t-1}+b_{r})\\h_{t}&amp;=(1-z_{t})\circ h_{t-1}+z_{t}\circ \sigma _{h}(W_{h}x_{t}+U_{h}(r_{t}\circ h_{t-1})+b_{h})\end{aligned}}}">
+                <a:extLst>
+                  <a:ext uri="{FF2B5EF4-FFF2-40B4-BE49-F238E27FC236}">
+                    <a16:creationId xmlns:a16="http://schemas.microsoft.com/office/drawing/2014/main" id="{E8EFC93E-C427-4320-9750-D0E0F492021C}"/>
+                  </a:ext>
+                </a:extLst>
+              </p:cNvPr>
+              <p:cNvSpPr>
+                <a:spLocks noGrp="1" noRot="1" noChangeAspect="1" noMove="1" noResize="1" noEditPoints="1" noAdjustHandles="1" noChangeArrowheads="1" noChangeShapeType="1" noTextEdit="1"/>
+              </p:cNvSpPr>
+              <p:nvPr>
+                <p:ph idx="1"/>
+              </p:nvPr>
+            </p:nvSpPr>
+            <p:spPr bwMode="auto">
+              <a:prstGeom prst="rect">
+                <a:avLst/>
+              </a:prstGeom>
+              <a:blipFill>
+                <a:blip r:embed="rId2"/>
+                <a:stretch>
+                  <a:fillRect l="-928" t="-1961"/>
+                </a:stretch>
+              </a:blipFill>
+              <a:extLst>
+                <a:ext uri="{909E8E84-426E-40DD-AFC4-6F175D3DCCD1}">
+                  <a14:hiddenFill xmlns:a14="http://schemas.microsoft.com/office/drawing/2010/main">
+                    <a:solidFill>
+                      <a:srgbClr val="FFFFFF"/>
+                    </a:solidFill>
+                  </a14:hiddenFill>
+                </a:ext>
+              </a:extLst>
+            </p:spPr>
+            <p:txBody>
+              <a:bodyPr/>
+              <a:lstStyle/>
+              <a:p>
+                <a:r>
+                  <a:rPr lang="en-US">
+                    <a:noFill/>
+                  </a:rPr>
+                  <a:t> </a:t>
+                </a:r>
+              </a:p>
+            </p:txBody>
+          </p:sp>
+        </mc:Fallback>
+      </mc:AlternateContent>
+    </p:spTree>
+    <p:extLst>
+      <p:ext uri="{BB962C8B-B14F-4D97-AF65-F5344CB8AC3E}">
+        <p14:creationId xmlns:p14="http://schemas.microsoft.com/office/powerpoint/2010/main" val="253768618"/>
+      </p:ext>
+    </p:extLst>
+  </p:cSld>
+  <p:clrMapOvr>
+    <a:masterClrMapping/>
+  </p:clrMapOvr>
+</p:sld>
+</file>
+
 <file path=ppt/slides/slide2.xml><?xml version="1.0" encoding="utf-8"?>
 <p:sld xmlns:a="http://schemas.openxmlformats.org/drawingml/2006/main" xmlns:r="http://schemas.openxmlformats.org/officeDocument/2006/relationships" xmlns:p="http://schemas.openxmlformats.org/presentationml/2006/main">
   <p:cSld>

</xml_diff>